<commit_message>
Syncing with repository. Committing my slides for the presentation.
</commit_message>
<xml_diff>
--- a/CSE881_Hormasji_Reiff_FinalProjectPresentation.pptx
+++ b/CSE881_Hormasji_Reiff_FinalProjectPresentation.pptx
@@ -5,22 +5,15 @@
     <p:sldMasterId id="2147483648" r:id="rId1"/>
   </p:sldMasterIdLst>
   <p:notesMasterIdLst>
-    <p:notesMasterId r:id="rId15"/>
+    <p:notesMasterId r:id="rId8"/>
   </p:notesMasterIdLst>
   <p:sldIdLst>
     <p:sldId id="264" r:id="rId2"/>
-    <p:sldId id="265" r:id="rId3"/>
-    <p:sldId id="295" r:id="rId4"/>
-    <p:sldId id="297" r:id="rId5"/>
-    <p:sldId id="299" r:id="rId6"/>
-    <p:sldId id="300" r:id="rId7"/>
-    <p:sldId id="303" r:id="rId8"/>
-    <p:sldId id="304" r:id="rId9"/>
-    <p:sldId id="301" r:id="rId10"/>
-    <p:sldId id="302" r:id="rId11"/>
-    <p:sldId id="298" r:id="rId12"/>
-    <p:sldId id="305" r:id="rId13"/>
-    <p:sldId id="284" r:id="rId14"/>
+    <p:sldId id="295" r:id="rId3"/>
+    <p:sldId id="299" r:id="rId4"/>
+    <p:sldId id="306" r:id="rId5"/>
+    <p:sldId id="301" r:id="rId6"/>
+    <p:sldId id="307" r:id="rId7"/>
   </p:sldIdLst>
   <p:sldSz cx="9144000" cy="6858000" type="screen4x3"/>
   <p:notesSz cx="6858000" cy="9144000"/>
@@ -264,7 +257,7 @@
             <a:fld id="{3DF477A2-2853-4D73-8D65-65AEF76BBBA8}" type="datetimeFigureOut">
               <a:rPr lang="en-US" smtClean="0"/>
               <a:pPr/>
-              <a:t>12/5/2015</a:t>
+              <a:t>12/7/2015</a:t>
             </a:fld>
             <a:endParaRPr lang="en-US"/>
           </a:p>
@@ -649,12 +642,12 @@
 </p:notes>
 </file>
 
-<file path=ppt/notesSlides/notesSlide10.xml><?xml version="1.0" encoding="utf-8"?>
-<p:notes xmlns:a="http://schemas.openxmlformats.org/drawingml/2006/main" xmlns:r="http://schemas.openxmlformats.org/officeDocument/2006/relationships" xmlns:p="http://schemas.openxmlformats.org/presentationml/2006/main" showMasterSp="0" showMasterPhAnim="0">
+<file path=ppt/notesSlides/notesSlide2.xml><?xml version="1.0" encoding="utf-8"?>
+<p:notes xmlns:a="http://schemas.openxmlformats.org/drawingml/2006/main" xmlns:r="http://schemas.openxmlformats.org/officeDocument/2006/relationships" xmlns:p="http://schemas.openxmlformats.org/presentationml/2006/main">
   <p:cSld>
     <p:spTree>
       <p:nvGrpSpPr>
-        <p:cNvPr id="1" name="Shape 181"/>
+        <p:cNvPr id="1" name=""/>
         <p:cNvGrpSpPr/>
         <p:nvPr/>
       </p:nvGrpSpPr>
@@ -668,7 +661,154 @@
       </p:grpSpPr>
       <p:sp>
         <p:nvSpPr>
-          <p:cNvPr id="182" name="Shape 182"/>
+          <p:cNvPr id="2" name="Slide Image Placeholder 1"/>
+          <p:cNvSpPr>
+            <a:spLocks noGrp="1" noRot="1" noChangeAspect="1"/>
+          </p:cNvSpPr>
+          <p:nvPr>
+            <p:ph type="sldImg"/>
+          </p:nvPr>
+        </p:nvSpPr>
+        <p:spPr/>
+      </p:sp>
+      <p:sp>
+        <p:nvSpPr>
+          <p:cNvPr id="3" name="Notes Placeholder 2"/>
+          <p:cNvSpPr>
+            <a:spLocks noGrp="1"/>
+          </p:cNvSpPr>
+          <p:nvPr>
+            <p:ph type="body" idx="1"/>
+          </p:nvPr>
+        </p:nvSpPr>
+        <p:spPr/>
+        <p:txBody>
+          <a:bodyPr/>
+          <a:lstStyle/>
+          <a:p>
+            <a:r>
+              <a:rPr lang="en-US" dirty="0" smtClean="0"/>
+              <a:t>Image source: http://i1-news.softpedia-static.com/images/news2/Twitter-Debuts-Embeddable-Streams-so-You-Can-Take-Twitter-Anywhere-You-Go-2.png</a:t>
+            </a:r>
+          </a:p>
+          <a:p>
+            <a:endParaRPr lang="en-US" dirty="0" smtClean="0"/>
+          </a:p>
+          <a:p>
+            <a:r>
+              <a:rPr lang="en-US" dirty="0" smtClean="0"/>
+              <a:t>Popularity defined in terms of retweet count and favorite count</a:t>
+            </a:r>
+          </a:p>
+          <a:p>
+            <a:endParaRPr lang="en-US" dirty="0" smtClean="0"/>
+          </a:p>
+          <a:p>
+            <a:r>
+              <a:rPr lang="en-US" dirty="0" smtClean="0"/>
+              <a:t>Motivation</a:t>
+            </a:r>
+            <a:r>
+              <a:rPr lang="en-US" baseline="0" dirty="0" smtClean="0"/>
+              <a:t> behind the research question:</a:t>
+            </a:r>
+          </a:p>
+          <a:p>
+            <a:pPr marL="171450" indent="-171450">
+              <a:buFont typeface="Arial" panose="020B0604020202020204" pitchFamily="34" charset="0"/>
+              <a:buChar char="•"/>
+            </a:pPr>
+            <a:r>
+              <a:rPr lang="en-US" baseline="0" dirty="0" smtClean="0"/>
+              <a:t>Interesting problem</a:t>
+            </a:r>
+          </a:p>
+          <a:p>
+            <a:pPr marL="171450" indent="-171450">
+              <a:buFont typeface="Arial" panose="020B0604020202020204" pitchFamily="34" charset="0"/>
+              <a:buChar char="•"/>
+            </a:pPr>
+            <a:r>
+              <a:rPr lang="en-US" baseline="0" dirty="0" smtClean="0"/>
+              <a:t>Opportunity to work with social media data mining</a:t>
+            </a:r>
+          </a:p>
+          <a:p>
+            <a:pPr marL="171450" indent="-171450">
+              <a:buFont typeface="Arial" panose="020B0604020202020204" pitchFamily="34" charset="0"/>
+              <a:buChar char="•"/>
+            </a:pPr>
+            <a:r>
+              <a:rPr lang="en-US" baseline="0" dirty="0" smtClean="0"/>
+              <a:t>Knowing the determining factors can help a user to understand how to get more people to see his or her Tweet </a:t>
+            </a:r>
+            <a:r>
+              <a:rPr lang="en-US" baseline="0" dirty="0" smtClean="0">
+                <a:sym typeface="Wingdings" panose="05000000000000000000" pitchFamily="2" charset="2"/>
+              </a:rPr>
+              <a:t> could be important for application such as political domain where a candidate wants to reach a larger user base</a:t>
+            </a:r>
+            <a:endParaRPr lang="en-US" dirty="0" smtClean="0"/>
+          </a:p>
+        </p:txBody>
+      </p:sp>
+      <p:sp>
+        <p:nvSpPr>
+          <p:cNvPr id="4" name="Slide Number Placeholder 3"/>
+          <p:cNvSpPr>
+            <a:spLocks noGrp="1"/>
+          </p:cNvSpPr>
+          <p:nvPr>
+            <p:ph type="sldNum" sz="quarter" idx="10"/>
+          </p:nvPr>
+        </p:nvSpPr>
+        <p:spPr/>
+        <p:txBody>
+          <a:bodyPr/>
+          <a:lstStyle/>
+          <a:p>
+            <a:fld id="{9A41F1D6-4599-4B85-B113-377F36F3BC98}" type="slidenum">
+              <a:rPr lang="en-US" smtClean="0"/>
+              <a:pPr/>
+              <a:t>2</a:t>
+            </a:fld>
+            <a:endParaRPr lang="en-US"/>
+          </a:p>
+        </p:txBody>
+      </p:sp>
+    </p:spTree>
+    <p:extLst>
+      <p:ext uri="{BB962C8B-B14F-4D97-AF65-F5344CB8AC3E}">
+        <p14:creationId xmlns:p14="http://schemas.microsoft.com/office/powerpoint/2010/main" val="1334582004"/>
+      </p:ext>
+    </p:extLst>
+  </p:cSld>
+  <p:clrMapOvr>
+    <a:masterClrMapping/>
+  </p:clrMapOvr>
+</p:notes>
+</file>
+
+<file path=ppt/notesSlides/notesSlide3.xml><?xml version="1.0" encoding="utf-8"?>
+<p:notes xmlns:a="http://schemas.openxmlformats.org/drawingml/2006/main" xmlns:r="http://schemas.openxmlformats.org/officeDocument/2006/relationships" xmlns:p="http://schemas.openxmlformats.org/presentationml/2006/main" showMasterSp="0" showMasterPhAnim="0">
+  <p:cSld>
+    <p:spTree>
+      <p:nvGrpSpPr>
+        <p:cNvPr id="1" name="Shape 58"/>
+        <p:cNvGrpSpPr/>
+        <p:nvPr/>
+      </p:nvGrpSpPr>
+      <p:grpSpPr>
+        <a:xfrm>
+          <a:off x="0" y="0"/>
+          <a:ext cx="0" cy="0"/>
+          <a:chOff x="0" y="0"/>
+          <a:chExt cx="0" cy="0"/>
+        </a:xfrm>
+      </p:grpSpPr>
+      <p:sp>
+        <p:nvSpPr>
+          <p:cNvPr id="59" name="Shape 59"/>
           <p:cNvSpPr>
             <a:spLocks noGrp="1" noRot="1" noChangeAspect="1"/>
           </p:cNvSpPr>
@@ -719,7 +859,7 @@
       </p:sp>
       <p:sp>
         <p:nvSpPr>
-          <p:cNvPr id="183" name="Shape 183"/>
+          <p:cNvPr id="60" name="Shape 60"/>
           <p:cNvSpPr txBox="1">
             <a:spLocks noGrp="1"/>
           </p:cNvSpPr>
@@ -742,20 +882,156 @@
           </a:bodyPr>
           <a:lstStyle/>
           <a:p>
-            <a:pPr>
-              <a:spcBef>
-                <a:spcPts val="0"/>
-              </a:spcBef>
-              <a:buNone/>
-            </a:pPr>
-            <a:endParaRPr/>
+            <a:pPr marL="171450" indent="-171450">
+              <a:spcBef>
+                <a:spcPts val="0"/>
+              </a:spcBef>
+              <a:buFont typeface="Arial" panose="020B0604020202020204" pitchFamily="34" charset="0"/>
+              <a:buChar char="•"/>
+            </a:pPr>
+            <a:r>
+              <a:rPr lang="en" dirty="0" smtClean="0"/>
+              <a:t>PHP</a:t>
+            </a:r>
+            <a:r>
+              <a:rPr lang="en" baseline="0" dirty="0" smtClean="0"/>
+              <a:t> </a:t>
+            </a:r>
+            <a:r>
+              <a:rPr lang="en" baseline="0" dirty="0" smtClean="0"/>
+              <a:t>programs are </a:t>
+            </a:r>
+            <a:r>
+              <a:rPr lang="en" baseline="0" dirty="0" smtClean="0"/>
+              <a:t>based loosely on the getTwitter.php program provided for reference by the professor</a:t>
+            </a:r>
+          </a:p>
+          <a:p>
+            <a:pPr marL="171450" indent="-171450">
+              <a:spcBef>
+                <a:spcPts val="0"/>
+              </a:spcBef>
+              <a:buFont typeface="Arial" panose="020B0604020202020204" pitchFamily="34" charset="0"/>
+              <a:buChar char="•"/>
+            </a:pPr>
+            <a:r>
+              <a:rPr lang="en" baseline="0" dirty="0" smtClean="0"/>
+              <a:t>Uses Twitter libraries developed by Matt Harris (located on Github)</a:t>
+            </a:r>
+          </a:p>
+          <a:p>
+            <a:pPr marL="171450" marR="0" lvl="0" indent="-171450" algn="l" defTabSz="914400" rtl="0" eaLnBrk="1" fontAlgn="auto" latinLnBrk="0" hangingPunct="1">
+              <a:lnSpc>
+                <a:spcPct val="100000"/>
+              </a:lnSpc>
+              <a:spcBef>
+                <a:spcPts val="0"/>
+              </a:spcBef>
+              <a:spcAft>
+                <a:spcPts val="0"/>
+              </a:spcAft>
+              <a:buClrTx/>
+              <a:buSzTx/>
+              <a:buFont typeface="Arial" panose="020B0604020202020204" pitchFamily="34" charset="0"/>
+              <a:buChar char="•"/>
+              <a:tabLst/>
+              <a:defRPr/>
+            </a:pPr>
+            <a:r>
+              <a:rPr lang="en" baseline="0" dirty="0" smtClean="0"/>
+              <a:t>Public Stream API: </a:t>
+            </a:r>
+            <a:r>
+              <a:rPr lang="en-US" sz="1200" dirty="0" smtClean="0"/>
+              <a:t>returns a current stream of public statuses filtered by options such as language, keywords, and </a:t>
+            </a:r>
+            <a:r>
+              <a:rPr lang="en-US" sz="1200" dirty="0" smtClean="0"/>
+              <a:t>locations</a:t>
+            </a:r>
+          </a:p>
+          <a:p>
+            <a:pPr marL="171450" marR="0" lvl="0" indent="-171450" algn="l" defTabSz="914400" rtl="0" eaLnBrk="1" fontAlgn="auto" latinLnBrk="0" hangingPunct="1">
+              <a:lnSpc>
+                <a:spcPct val="100000"/>
+              </a:lnSpc>
+              <a:spcBef>
+                <a:spcPts val="0"/>
+              </a:spcBef>
+              <a:spcAft>
+                <a:spcPts val="0"/>
+              </a:spcAft>
+              <a:buClrTx/>
+              <a:buSzTx/>
+              <a:buFont typeface="Arial" panose="020B0604020202020204" pitchFamily="34" charset="0"/>
+              <a:buChar char="•"/>
+              <a:tabLst/>
+              <a:defRPr/>
+            </a:pPr>
+            <a:r>
+              <a:rPr lang="en" dirty="0" smtClean="0"/>
+              <a:t>Search</a:t>
+            </a:r>
+            <a:r>
+              <a:rPr lang="en" baseline="0" dirty="0" smtClean="0"/>
+              <a:t> API: </a:t>
+            </a:r>
+            <a:r>
+              <a:rPr lang="en-US" sz="1200" dirty="0" smtClean="0"/>
+              <a:t>allows queries for recent Tweets by ID </a:t>
+            </a:r>
+            <a:endParaRPr lang="en-US" sz="1200" dirty="0" smtClean="0"/>
+          </a:p>
+          <a:p>
+            <a:pPr marL="171450" marR="0" lvl="0" indent="-171450" algn="l" defTabSz="914400" rtl="0" eaLnBrk="1" fontAlgn="auto" latinLnBrk="0" hangingPunct="1">
+              <a:lnSpc>
+                <a:spcPct val="100000"/>
+              </a:lnSpc>
+              <a:spcBef>
+                <a:spcPts val="0"/>
+              </a:spcBef>
+              <a:spcAft>
+                <a:spcPts val="0"/>
+              </a:spcAft>
+              <a:buClrTx/>
+              <a:buSzTx/>
+              <a:buFont typeface="Arial" panose="020B0604020202020204" pitchFamily="34" charset="0"/>
+              <a:buChar char="•"/>
+              <a:tabLst/>
+              <a:defRPr/>
+            </a:pPr>
+            <a:r>
+              <a:rPr lang="en-US" sz="1200" dirty="0" smtClean="0"/>
+              <a:t>Constraints on the stream:</a:t>
+            </a:r>
+            <a:r>
+              <a:rPr lang="en-US" sz="1200" baseline="0" dirty="0" smtClean="0"/>
+              <a:t> </a:t>
+            </a:r>
+            <a:r>
+              <a:rPr lang="en-US" sz="1200" baseline="0" dirty="0" smtClean="0"/>
+              <a:t>&gt;500 followers for user and </a:t>
+            </a:r>
+            <a:r>
+              <a:rPr lang="en-US" sz="1200" baseline="0" dirty="0" smtClean="0"/>
+              <a:t>Tweet </a:t>
+            </a:r>
+            <a:r>
+              <a:rPr lang="en-US" sz="1200" baseline="0" dirty="0" smtClean="0"/>
+              <a:t>is not already a </a:t>
+            </a:r>
+            <a:r>
+              <a:rPr lang="en-US" sz="1200" baseline="0" dirty="0" smtClean="0"/>
+              <a:t>Retweet</a:t>
+            </a:r>
+            <a:endParaRPr lang="en-US" sz="1200" dirty="0" smtClean="0"/>
           </a:p>
         </p:txBody>
       </p:sp>
     </p:spTree>
     <p:extLst>
       <p:ext uri="{BB962C8B-B14F-4D97-AF65-F5344CB8AC3E}">
-        <p14:creationId xmlns:p14="http://schemas.microsoft.com/office/powerpoint/2010/main" val="3207316579"/>
+        <p14:creationId xmlns:p14="http://schemas.microsoft.com/office/powerpoint/2010/main" val="3248734576"/>
       </p:ext>
     </p:extLst>
   </p:cSld>
@@ -765,7 +1041,7 @@
 </p:notes>
 </file>
 
-<file path=ppt/notesSlides/notesSlide2.xml><?xml version="1.0" encoding="utf-8"?>
+<file path=ppt/notesSlides/notesSlide4.xml><?xml version="1.0" encoding="utf-8"?>
 <p:notes xmlns:a="http://schemas.openxmlformats.org/drawingml/2006/main" xmlns:r="http://schemas.openxmlformats.org/officeDocument/2006/relationships" xmlns:p="http://schemas.openxmlformats.org/presentationml/2006/main" showMasterSp="0" showMasterPhAnim="0">
   <p:cSld>
     <p:spTree>
@@ -858,20 +1134,49 @@
           </a:bodyPr>
           <a:lstStyle/>
           <a:p>
-            <a:pPr>
-              <a:spcBef>
-                <a:spcPts val="0"/>
-              </a:spcBef>
+            <a:pPr marL="0" marR="0" lvl="0" indent="0" algn="l" defTabSz="914400" rtl="0" eaLnBrk="1" fontAlgn="auto" latinLnBrk="0" hangingPunct="1">
+              <a:lnSpc>
+                <a:spcPct val="100000"/>
+              </a:lnSpc>
+              <a:spcBef>
+                <a:spcPts val="0"/>
+              </a:spcBef>
+              <a:spcAft>
+                <a:spcPts val="0"/>
+              </a:spcAft>
+              <a:buClrTx/>
+              <a:buSzTx/>
+              <a:buFont typeface="Arial" panose="020B0604020202020204" pitchFamily="34" charset="0"/>
               <a:buNone/>
-            </a:pPr>
-            <a:endParaRPr lang="en" dirty="0"/>
+              <a:tabLst/>
+              <a:defRPr/>
+            </a:pPr>
+            <a:r>
+              <a:rPr lang="en-US" sz="1200" dirty="0" smtClean="0"/>
+              <a:t>Chosen attributes</a:t>
+            </a:r>
+            <a:r>
+              <a:rPr lang="en-US" sz="1200" baseline="0" dirty="0" smtClean="0"/>
+              <a:t> include information about the text of the Tweet, meta-information (i.e. retweeted or quoted status), information about the user who posted the Tweet</a:t>
+            </a:r>
+            <a:endParaRPr lang="en-US" sz="1200" dirty="0" smtClean="0"/>
+          </a:p>
+          <a:p>
+            <a:pPr marL="0" indent="0">
+              <a:spcBef>
+                <a:spcPts val="0"/>
+              </a:spcBef>
+              <a:buFont typeface="Arial" panose="020B0604020202020204" pitchFamily="34" charset="0"/>
+              <a:buNone/>
+            </a:pPr>
+            <a:endParaRPr lang="en-US" sz="1200" dirty="0" smtClean="0"/>
           </a:p>
         </p:txBody>
       </p:sp>
     </p:spTree>
     <p:extLst>
       <p:ext uri="{BB962C8B-B14F-4D97-AF65-F5344CB8AC3E}">
-        <p14:creationId xmlns:p14="http://schemas.microsoft.com/office/powerpoint/2010/main" val="2929051481"/>
+        <p14:creationId xmlns:p14="http://schemas.microsoft.com/office/powerpoint/2010/main" val="4147089486"/>
       </p:ext>
     </p:extLst>
   </p:cSld>
@@ -881,139 +1186,7 @@
 </p:notes>
 </file>
 
-<file path=ppt/notesSlides/notesSlide3.xml><?xml version="1.0" encoding="utf-8"?>
-<p:notes xmlns:a="http://schemas.openxmlformats.org/drawingml/2006/main" xmlns:r="http://schemas.openxmlformats.org/officeDocument/2006/relationships" xmlns:p="http://schemas.openxmlformats.org/presentationml/2006/main">
-  <p:cSld>
-    <p:spTree>
-      <p:nvGrpSpPr>
-        <p:cNvPr id="1" name=""/>
-        <p:cNvGrpSpPr/>
-        <p:nvPr/>
-      </p:nvGrpSpPr>
-      <p:grpSpPr>
-        <a:xfrm>
-          <a:off x="0" y="0"/>
-          <a:ext cx="0" cy="0"/>
-          <a:chOff x="0" y="0"/>
-          <a:chExt cx="0" cy="0"/>
-        </a:xfrm>
-      </p:grpSpPr>
-      <p:sp>
-        <p:nvSpPr>
-          <p:cNvPr id="2" name="Slide Image Placeholder 1"/>
-          <p:cNvSpPr>
-            <a:spLocks noGrp="1" noRot="1" noChangeAspect="1"/>
-          </p:cNvSpPr>
-          <p:nvPr>
-            <p:ph type="sldImg"/>
-          </p:nvPr>
-        </p:nvSpPr>
-        <p:spPr/>
-      </p:sp>
-      <p:sp>
-        <p:nvSpPr>
-          <p:cNvPr id="3" name="Notes Placeholder 2"/>
-          <p:cNvSpPr>
-            <a:spLocks noGrp="1"/>
-          </p:cNvSpPr>
-          <p:nvPr>
-            <p:ph type="body" idx="1"/>
-          </p:nvPr>
-        </p:nvSpPr>
-        <p:spPr/>
-        <p:txBody>
-          <a:bodyPr/>
-          <a:lstStyle/>
-          <a:p>
-            <a:r>
-              <a:rPr lang="en-US" dirty="0" smtClean="0"/>
-              <a:t>Image source: http://i1-news.softpedia-static.com/images/news2/Twitter-Debuts-Embeddable-Streams-so-You-Can-Take-Twitter-Anywhere-You-Go-2.png</a:t>
-            </a:r>
-          </a:p>
-          <a:p>
-            <a:endParaRPr lang="en-US" dirty="0" smtClean="0"/>
-          </a:p>
-          <a:p>
-            <a:r>
-              <a:rPr lang="en-US" dirty="0" smtClean="0"/>
-              <a:t>Motivation</a:t>
-            </a:r>
-            <a:r>
-              <a:rPr lang="en-US" baseline="0" dirty="0" smtClean="0"/>
-              <a:t> behind the research question:</a:t>
-            </a:r>
-          </a:p>
-          <a:p>
-            <a:pPr marL="171450" indent="-171450">
-              <a:buFont typeface="Arial" panose="020B0604020202020204" pitchFamily="34" charset="0"/>
-              <a:buChar char="•"/>
-            </a:pPr>
-            <a:r>
-              <a:rPr lang="en-US" baseline="0" dirty="0" smtClean="0"/>
-              <a:t>Interesting problem</a:t>
-            </a:r>
-          </a:p>
-          <a:p>
-            <a:pPr marL="171450" indent="-171450">
-              <a:buFont typeface="Arial" panose="020B0604020202020204" pitchFamily="34" charset="0"/>
-              <a:buChar char="•"/>
-            </a:pPr>
-            <a:r>
-              <a:rPr lang="en-US" baseline="0" dirty="0" smtClean="0"/>
-              <a:t>Opportunity to work with social media data mining</a:t>
-            </a:r>
-          </a:p>
-          <a:p>
-            <a:pPr marL="171450" indent="-171450">
-              <a:buFont typeface="Arial" panose="020B0604020202020204" pitchFamily="34" charset="0"/>
-              <a:buChar char="•"/>
-            </a:pPr>
-            <a:r>
-              <a:rPr lang="en-US" baseline="0" dirty="0" smtClean="0"/>
-              <a:t>Knowing the important factors can help a user to understand how to get more people to see his or her Tweet</a:t>
-            </a:r>
-            <a:endParaRPr lang="en-US" dirty="0" smtClean="0"/>
-          </a:p>
-        </p:txBody>
-      </p:sp>
-      <p:sp>
-        <p:nvSpPr>
-          <p:cNvPr id="4" name="Slide Number Placeholder 3"/>
-          <p:cNvSpPr>
-            <a:spLocks noGrp="1"/>
-          </p:cNvSpPr>
-          <p:nvPr>
-            <p:ph type="sldNum" sz="quarter" idx="10"/>
-          </p:nvPr>
-        </p:nvSpPr>
-        <p:spPr/>
-        <p:txBody>
-          <a:bodyPr/>
-          <a:lstStyle/>
-          <a:p>
-            <a:fld id="{9A41F1D6-4599-4B85-B113-377F36F3BC98}" type="slidenum">
-              <a:rPr lang="en-US" smtClean="0"/>
-              <a:pPr/>
-              <a:t>3</a:t>
-            </a:fld>
-            <a:endParaRPr lang="en-US"/>
-          </a:p>
-        </p:txBody>
-      </p:sp>
-    </p:spTree>
-    <p:extLst>
-      <p:ext uri="{BB962C8B-B14F-4D97-AF65-F5344CB8AC3E}">
-        <p14:creationId xmlns:p14="http://schemas.microsoft.com/office/powerpoint/2010/main" val="1334582004"/>
-      </p:ext>
-    </p:extLst>
-  </p:cSld>
-  <p:clrMapOvr>
-    <a:masterClrMapping/>
-  </p:clrMapOvr>
-</p:notes>
-</file>
-
-<file path=ppt/notesSlides/notesSlide4.xml><?xml version="1.0" encoding="utf-8"?>
+<file path=ppt/notesSlides/notesSlide5.xml><?xml version="1.0" encoding="utf-8"?>
 <p:notes xmlns:a="http://schemas.openxmlformats.org/drawingml/2006/main" xmlns:r="http://schemas.openxmlformats.org/officeDocument/2006/relationships" xmlns:p="http://schemas.openxmlformats.org/presentationml/2006/main" showMasterSp="0" showMasterPhAnim="0">
   <p:cSld>
     <p:spTree>
@@ -1106,106 +1279,35 @@
           </a:bodyPr>
           <a:lstStyle/>
           <a:p>
-            <a:pPr marL="171450" indent="-171450">
+            <a:pPr marL="0" indent="0">
               <a:spcBef>
                 <a:spcPts val="0"/>
               </a:spcBef>
               <a:buFont typeface="Arial" panose="020B0604020202020204" pitchFamily="34" charset="0"/>
-              <a:buChar char="•"/>
-            </a:pPr>
-            <a:r>
-              <a:rPr lang="en" dirty="0" smtClean="0"/>
-              <a:t>PHP</a:t>
-            </a:r>
-            <a:r>
-              <a:rPr lang="en" baseline="0" dirty="0" smtClean="0"/>
-              <a:t> program is based loosely on the getTwitter.php program provided for reference by the professor</a:t>
-            </a:r>
-          </a:p>
-          <a:p>
-            <a:pPr marL="171450" indent="-171450">
-              <a:spcBef>
-                <a:spcPts val="0"/>
-              </a:spcBef>
-              <a:buFont typeface="Arial" panose="020B0604020202020204" pitchFamily="34" charset="0"/>
-              <a:buChar char="•"/>
-            </a:pPr>
-            <a:r>
-              <a:rPr lang="en" baseline="0" dirty="0" smtClean="0"/>
-              <a:t>Uses Twitter libraries developed by Matt Harris (located on Github)</a:t>
-            </a:r>
-          </a:p>
-          <a:p>
-            <a:pPr marL="171450" marR="0" lvl="0" indent="-171450" algn="l" defTabSz="914400" rtl="0" eaLnBrk="1" fontAlgn="auto" latinLnBrk="0" hangingPunct="1">
-              <a:lnSpc>
-                <a:spcPct val="100000"/>
-              </a:lnSpc>
-              <a:spcBef>
-                <a:spcPts val="0"/>
-              </a:spcBef>
-              <a:spcAft>
-                <a:spcPts val="0"/>
-              </a:spcAft>
-              <a:buClrTx/>
-              <a:buSzTx/>
-              <a:buFont typeface="Arial" panose="020B0604020202020204" pitchFamily="34" charset="0"/>
-              <a:buChar char="•"/>
-              <a:tabLst/>
-              <a:defRPr/>
-            </a:pPr>
-            <a:r>
-              <a:rPr lang="en" baseline="0" dirty="0" smtClean="0"/>
-              <a:t>Public Stream API: </a:t>
-            </a:r>
+              <a:buNone/>
+            </a:pPr>
             <a:r>
               <a:rPr lang="en-US" sz="1200" dirty="0" smtClean="0"/>
-              <a:t>returns a current stream of public statuses filtered by options such as language, keywords, and locations</a:t>
-            </a:r>
-          </a:p>
-          <a:p>
-            <a:pPr marL="171450" marR="0" lvl="0" indent="-171450" algn="l" defTabSz="914400" rtl="0" eaLnBrk="1" fontAlgn="auto" latinLnBrk="0" hangingPunct="1">
-              <a:lnSpc>
-                <a:spcPct val="100000"/>
-              </a:lnSpc>
-              <a:spcBef>
-                <a:spcPts val="0"/>
-              </a:spcBef>
-              <a:spcAft>
-                <a:spcPts val="0"/>
-              </a:spcAft>
-              <a:buClrTx/>
-              <a:buSzTx/>
-              <a:buFont typeface="Arial" panose="020B0604020202020204" pitchFamily="34" charset="0"/>
-              <a:buChar char="•"/>
-              <a:tabLst/>
-              <a:defRPr/>
-            </a:pPr>
-            <a:r>
-              <a:rPr lang="en-US" sz="1200" dirty="0" smtClean="0"/>
-              <a:t>Chosen attributes</a:t>
+              <a:t>Limitation of the classification: limited number of “popular” tweets in the</a:t>
             </a:r>
             <a:r>
               <a:rPr lang="en-US" sz="1200" baseline="0" dirty="0" smtClean="0"/>
-              <a:t> include information about the text of the Tweet, meta-information (i.e. retweeted or quoted status), information about the user who posted the Tweet</a:t>
+              <a:t> data stream </a:t>
+            </a:r>
+            <a:r>
+              <a:rPr lang="en-US" sz="1200" baseline="0" dirty="0" smtClean="0">
+                <a:sym typeface="Wingdings" panose="05000000000000000000" pitchFamily="2" charset="2"/>
+              </a:rPr>
+              <a:t> many of the Tweets did not show a high retweet or favorite count in any of the searches</a:t>
             </a:r>
             <a:endParaRPr lang="en-US" sz="1200" dirty="0" smtClean="0"/>
-          </a:p>
-          <a:p>
-            <a:pPr marL="171450" indent="-171450">
-              <a:spcBef>
-                <a:spcPts val="0"/>
-              </a:spcBef>
-              <a:buFont typeface="Arial" panose="020B0604020202020204" pitchFamily="34" charset="0"/>
-              <a:buChar char="•"/>
-            </a:pPr>
-            <a:endParaRPr lang="en" dirty="0"/>
           </a:p>
         </p:txBody>
       </p:sp>
     </p:spTree>
     <p:extLst>
       <p:ext uri="{BB962C8B-B14F-4D97-AF65-F5344CB8AC3E}">
-        <p14:creationId xmlns:p14="http://schemas.microsoft.com/office/powerpoint/2010/main" val="3248734576"/>
+        <p14:creationId xmlns:p14="http://schemas.microsoft.com/office/powerpoint/2010/main" val="673001094"/>
       </p:ext>
     </p:extLst>
   </p:cSld>
@@ -1215,7 +1317,7 @@
 </p:notes>
 </file>
 
-<file path=ppt/notesSlides/notesSlide5.xml><?xml version="1.0" encoding="utf-8"?>
+<file path=ppt/notesSlides/notesSlide6.xml><?xml version="1.0" encoding="utf-8"?>
 <p:notes xmlns:a="http://schemas.openxmlformats.org/drawingml/2006/main" xmlns:r="http://schemas.openxmlformats.org/officeDocument/2006/relationships" xmlns:p="http://schemas.openxmlformats.org/presentationml/2006/main" showMasterSp="0" showMasterPhAnim="0">
   <p:cSld>
     <p:spTree>
@@ -1315,549 +1417,14 @@
               <a:buFont typeface="Arial" panose="020B0604020202020204" pitchFamily="34" charset="0"/>
               <a:buChar char="•"/>
             </a:pPr>
-            <a:r>
-              <a:rPr lang="en" dirty="0" smtClean="0"/>
-              <a:t>PHP</a:t>
-            </a:r>
-            <a:r>
-              <a:rPr lang="en" baseline="0" dirty="0" smtClean="0"/>
-              <a:t> program is based loosely on the getTwitter.php program provided for reference by the professor</a:t>
-            </a:r>
-          </a:p>
-          <a:p>
-            <a:pPr marL="171450" indent="-171450">
-              <a:spcBef>
-                <a:spcPts val="0"/>
-              </a:spcBef>
-              <a:buFont typeface="Arial" panose="020B0604020202020204" pitchFamily="34" charset="0"/>
-              <a:buChar char="•"/>
-            </a:pPr>
-            <a:r>
-              <a:rPr lang="en" baseline="0" dirty="0" smtClean="0"/>
-              <a:t>Uses Twitter libraries developed by Matt Harris (located on Github)</a:t>
-            </a:r>
-          </a:p>
-          <a:p>
-            <a:pPr marL="171450" marR="0" lvl="0" indent="-171450" algn="l" defTabSz="914400" rtl="0" eaLnBrk="1" fontAlgn="auto" latinLnBrk="0" hangingPunct="1">
-              <a:lnSpc>
-                <a:spcPct val="100000"/>
-              </a:lnSpc>
-              <a:spcBef>
-                <a:spcPts val="0"/>
-              </a:spcBef>
-              <a:spcAft>
-                <a:spcPts val="0"/>
-              </a:spcAft>
-              <a:buClrTx/>
-              <a:buSzTx/>
-              <a:buFont typeface="Arial" panose="020B0604020202020204" pitchFamily="34" charset="0"/>
-              <a:buChar char="•"/>
-              <a:tabLst/>
-              <a:defRPr/>
-            </a:pPr>
-            <a:r>
-              <a:rPr lang="en" dirty="0" smtClean="0"/>
-              <a:t>Search</a:t>
-            </a:r>
-            <a:r>
-              <a:rPr lang="en" baseline="0" dirty="0" smtClean="0"/>
-              <a:t> API: </a:t>
-            </a:r>
-            <a:r>
-              <a:rPr lang="en-US" sz="1200" dirty="0" smtClean="0"/>
-              <a:t>allows queries for recent Tweets by ID </a:t>
-            </a:r>
+            <a:endParaRPr lang="en-US" sz="1200" dirty="0" smtClean="0"/>
           </a:p>
         </p:txBody>
       </p:sp>
     </p:spTree>
     <p:extLst>
       <p:ext uri="{BB962C8B-B14F-4D97-AF65-F5344CB8AC3E}">
-        <p14:creationId xmlns:p14="http://schemas.microsoft.com/office/powerpoint/2010/main" val="4140470011"/>
-      </p:ext>
-    </p:extLst>
-  </p:cSld>
-  <p:clrMapOvr>
-    <a:masterClrMapping/>
-  </p:clrMapOvr>
-</p:notes>
-</file>
-
-<file path=ppt/notesSlides/notesSlide6.xml><?xml version="1.0" encoding="utf-8"?>
-<p:notes xmlns:a="http://schemas.openxmlformats.org/drawingml/2006/main" xmlns:r="http://schemas.openxmlformats.org/officeDocument/2006/relationships" xmlns:p="http://schemas.openxmlformats.org/presentationml/2006/main" showMasterSp="0" showMasterPhAnim="0">
-  <p:cSld>
-    <p:spTree>
-      <p:nvGrpSpPr>
-        <p:cNvPr id="1" name="Shape 58"/>
-        <p:cNvGrpSpPr/>
-        <p:nvPr/>
-      </p:nvGrpSpPr>
-      <p:grpSpPr>
-        <a:xfrm>
-          <a:off x="0" y="0"/>
-          <a:ext cx="0" cy="0"/>
-          <a:chOff x="0" y="0"/>
-          <a:chExt cx="0" cy="0"/>
-        </a:xfrm>
-      </p:grpSpPr>
-      <p:sp>
-        <p:nvSpPr>
-          <p:cNvPr id="59" name="Shape 59"/>
-          <p:cNvSpPr>
-            <a:spLocks noGrp="1" noRot="1" noChangeAspect="1"/>
-          </p:cNvSpPr>
-          <p:nvPr>
-            <p:ph type="sldImg" idx="2"/>
-          </p:nvPr>
-        </p:nvSpPr>
-        <p:spPr>
-          <a:xfrm>
-            <a:off x="1143000" y="685800"/>
-            <a:ext cx="4572000" cy="3429000"/>
-          </a:xfrm>
-          <a:custGeom>
-            <a:avLst/>
-            <a:gdLst/>
-            <a:ahLst/>
-            <a:cxnLst/>
-            <a:rect l="0" t="0" r="0" b="0"/>
-            <a:pathLst>
-              <a:path w="120000" h="120000" extrusionOk="0">
-                <a:moveTo>
-                  <a:pt x="0" y="0"/>
-                </a:moveTo>
-                <a:lnTo>
-                  <a:pt x="120000" y="0"/>
-                </a:lnTo>
-                <a:lnTo>
-                  <a:pt x="120000" y="120000"/>
-                </a:lnTo>
-                <a:lnTo>
-                  <a:pt x="0" y="120000"/>
-                </a:lnTo>
-                <a:close/>
-              </a:path>
-            </a:pathLst>
-          </a:custGeom>
-          <a:noFill/>
-          <a:ln w="9525" cap="flat" cmpd="sng">
-            <a:solidFill>
-              <a:srgbClr val="000000"/>
-            </a:solidFill>
-            <a:prstDash val="solid"/>
-            <a:round/>
-            <a:headEnd type="none" w="med" len="med"/>
-            <a:tailEnd type="none" w="med" len="med"/>
-          </a:ln>
-        </p:spPr>
-      </p:sp>
-      <p:sp>
-        <p:nvSpPr>
-          <p:cNvPr id="60" name="Shape 60"/>
-          <p:cNvSpPr txBox="1">
-            <a:spLocks noGrp="1"/>
-          </p:cNvSpPr>
-          <p:nvPr>
-            <p:ph type="body" idx="1"/>
-          </p:nvPr>
-        </p:nvSpPr>
-        <p:spPr>
-          <a:xfrm>
-            <a:off x="685800" y="4343400"/>
-            <a:ext cx="5486399" cy="4114800"/>
-          </a:xfrm>
-          <a:prstGeom prst="rect">
-            <a:avLst/>
-          </a:prstGeom>
-        </p:spPr>
-        <p:txBody>
-          <a:bodyPr lIns="91425" tIns="91425" rIns="91425" bIns="91425" anchor="t" anchorCtr="0">
-            <a:noAutofit/>
-          </a:bodyPr>
-          <a:lstStyle/>
-          <a:p>
-            <a:pPr marL="171450" indent="-171450">
-              <a:spcBef>
-                <a:spcPts val="0"/>
-              </a:spcBef>
-              <a:buFont typeface="Arial" panose="020B0604020202020204" pitchFamily="34" charset="0"/>
-              <a:buChar char="•"/>
-            </a:pPr>
-            <a:endParaRPr lang="en-US" sz="1200" dirty="0" smtClean="0"/>
-          </a:p>
-        </p:txBody>
-      </p:sp>
-    </p:spTree>
-    <p:extLst>
-      <p:ext uri="{BB962C8B-B14F-4D97-AF65-F5344CB8AC3E}">
-        <p14:creationId xmlns:p14="http://schemas.microsoft.com/office/powerpoint/2010/main" val="46172575"/>
-      </p:ext>
-    </p:extLst>
-  </p:cSld>
-  <p:clrMapOvr>
-    <a:masterClrMapping/>
-  </p:clrMapOvr>
-</p:notes>
-</file>
-
-<file path=ppt/notesSlides/notesSlide7.xml><?xml version="1.0" encoding="utf-8"?>
-<p:notes xmlns:a="http://schemas.openxmlformats.org/drawingml/2006/main" xmlns:r="http://schemas.openxmlformats.org/officeDocument/2006/relationships" xmlns:p="http://schemas.openxmlformats.org/presentationml/2006/main" showMasterSp="0" showMasterPhAnim="0">
-  <p:cSld>
-    <p:spTree>
-      <p:nvGrpSpPr>
-        <p:cNvPr id="1" name="Shape 58"/>
-        <p:cNvGrpSpPr/>
-        <p:nvPr/>
-      </p:nvGrpSpPr>
-      <p:grpSpPr>
-        <a:xfrm>
-          <a:off x="0" y="0"/>
-          <a:ext cx="0" cy="0"/>
-          <a:chOff x="0" y="0"/>
-          <a:chExt cx="0" cy="0"/>
-        </a:xfrm>
-      </p:grpSpPr>
-      <p:sp>
-        <p:nvSpPr>
-          <p:cNvPr id="59" name="Shape 59"/>
-          <p:cNvSpPr>
-            <a:spLocks noGrp="1" noRot="1" noChangeAspect="1"/>
-          </p:cNvSpPr>
-          <p:nvPr>
-            <p:ph type="sldImg" idx="2"/>
-          </p:nvPr>
-        </p:nvSpPr>
-        <p:spPr>
-          <a:xfrm>
-            <a:off x="1143000" y="685800"/>
-            <a:ext cx="4572000" cy="3429000"/>
-          </a:xfrm>
-          <a:custGeom>
-            <a:avLst/>
-            <a:gdLst/>
-            <a:ahLst/>
-            <a:cxnLst/>
-            <a:rect l="0" t="0" r="0" b="0"/>
-            <a:pathLst>
-              <a:path w="120000" h="120000" extrusionOk="0">
-                <a:moveTo>
-                  <a:pt x="0" y="0"/>
-                </a:moveTo>
-                <a:lnTo>
-                  <a:pt x="120000" y="0"/>
-                </a:lnTo>
-                <a:lnTo>
-                  <a:pt x="120000" y="120000"/>
-                </a:lnTo>
-                <a:lnTo>
-                  <a:pt x="0" y="120000"/>
-                </a:lnTo>
-                <a:close/>
-              </a:path>
-            </a:pathLst>
-          </a:custGeom>
-          <a:noFill/>
-          <a:ln w="9525" cap="flat" cmpd="sng">
-            <a:solidFill>
-              <a:srgbClr val="000000"/>
-            </a:solidFill>
-            <a:prstDash val="solid"/>
-            <a:round/>
-            <a:headEnd type="none" w="med" len="med"/>
-            <a:tailEnd type="none" w="med" len="med"/>
-          </a:ln>
-        </p:spPr>
-      </p:sp>
-      <p:sp>
-        <p:nvSpPr>
-          <p:cNvPr id="60" name="Shape 60"/>
-          <p:cNvSpPr txBox="1">
-            <a:spLocks noGrp="1"/>
-          </p:cNvSpPr>
-          <p:nvPr>
-            <p:ph type="body" idx="1"/>
-          </p:nvPr>
-        </p:nvSpPr>
-        <p:spPr>
-          <a:xfrm>
-            <a:off x="685800" y="4343400"/>
-            <a:ext cx="5486399" cy="4114800"/>
-          </a:xfrm>
-          <a:prstGeom prst="rect">
-            <a:avLst/>
-          </a:prstGeom>
-        </p:spPr>
-        <p:txBody>
-          <a:bodyPr lIns="91425" tIns="91425" rIns="91425" bIns="91425" anchor="t" anchorCtr="0">
-            <a:noAutofit/>
-          </a:bodyPr>
-          <a:lstStyle/>
-          <a:p>
-            <a:pPr marL="171450" indent="-171450">
-              <a:spcBef>
-                <a:spcPts val="0"/>
-              </a:spcBef>
-              <a:buFont typeface="Arial" panose="020B0604020202020204" pitchFamily="34" charset="0"/>
-              <a:buChar char="•"/>
-            </a:pPr>
-            <a:endParaRPr lang="en-US" sz="1200" dirty="0" smtClean="0"/>
-          </a:p>
-        </p:txBody>
-      </p:sp>
-    </p:spTree>
-    <p:extLst>
-      <p:ext uri="{BB962C8B-B14F-4D97-AF65-F5344CB8AC3E}">
-        <p14:creationId xmlns:p14="http://schemas.microsoft.com/office/powerpoint/2010/main" val="673001094"/>
-      </p:ext>
-    </p:extLst>
-  </p:cSld>
-  <p:clrMapOvr>
-    <a:masterClrMapping/>
-  </p:clrMapOvr>
-</p:notes>
-</file>
-
-<file path=ppt/notesSlides/notesSlide8.xml><?xml version="1.0" encoding="utf-8"?>
-<p:notes xmlns:a="http://schemas.openxmlformats.org/drawingml/2006/main" xmlns:r="http://schemas.openxmlformats.org/officeDocument/2006/relationships" xmlns:p="http://schemas.openxmlformats.org/presentationml/2006/main" showMasterSp="0" showMasterPhAnim="0">
-  <p:cSld>
-    <p:spTree>
-      <p:nvGrpSpPr>
-        <p:cNvPr id="1" name="Shape 58"/>
-        <p:cNvGrpSpPr/>
-        <p:nvPr/>
-      </p:nvGrpSpPr>
-      <p:grpSpPr>
-        <a:xfrm>
-          <a:off x="0" y="0"/>
-          <a:ext cx="0" cy="0"/>
-          <a:chOff x="0" y="0"/>
-          <a:chExt cx="0" cy="0"/>
-        </a:xfrm>
-      </p:grpSpPr>
-      <p:sp>
-        <p:nvSpPr>
-          <p:cNvPr id="59" name="Shape 59"/>
-          <p:cNvSpPr>
-            <a:spLocks noGrp="1" noRot="1" noChangeAspect="1"/>
-          </p:cNvSpPr>
-          <p:nvPr>
-            <p:ph type="sldImg" idx="2"/>
-          </p:nvPr>
-        </p:nvSpPr>
-        <p:spPr>
-          <a:xfrm>
-            <a:off x="1143000" y="685800"/>
-            <a:ext cx="4572000" cy="3429000"/>
-          </a:xfrm>
-          <a:custGeom>
-            <a:avLst/>
-            <a:gdLst/>
-            <a:ahLst/>
-            <a:cxnLst/>
-            <a:rect l="0" t="0" r="0" b="0"/>
-            <a:pathLst>
-              <a:path w="120000" h="120000" extrusionOk="0">
-                <a:moveTo>
-                  <a:pt x="0" y="0"/>
-                </a:moveTo>
-                <a:lnTo>
-                  <a:pt x="120000" y="0"/>
-                </a:lnTo>
-                <a:lnTo>
-                  <a:pt x="120000" y="120000"/>
-                </a:lnTo>
-                <a:lnTo>
-                  <a:pt x="0" y="120000"/>
-                </a:lnTo>
-                <a:close/>
-              </a:path>
-            </a:pathLst>
-          </a:custGeom>
-          <a:noFill/>
-          <a:ln w="9525" cap="flat" cmpd="sng">
-            <a:solidFill>
-              <a:srgbClr val="000000"/>
-            </a:solidFill>
-            <a:prstDash val="solid"/>
-            <a:round/>
-            <a:headEnd type="none" w="med" len="med"/>
-            <a:tailEnd type="none" w="med" len="med"/>
-          </a:ln>
-        </p:spPr>
-      </p:sp>
-      <p:sp>
-        <p:nvSpPr>
-          <p:cNvPr id="60" name="Shape 60"/>
-          <p:cNvSpPr txBox="1">
-            <a:spLocks noGrp="1"/>
-          </p:cNvSpPr>
-          <p:nvPr>
-            <p:ph type="body" idx="1"/>
-          </p:nvPr>
-        </p:nvSpPr>
-        <p:spPr>
-          <a:xfrm>
-            <a:off x="685800" y="4343400"/>
-            <a:ext cx="5486399" cy="4114800"/>
-          </a:xfrm>
-          <a:prstGeom prst="rect">
-            <a:avLst/>
-          </a:prstGeom>
-        </p:spPr>
-        <p:txBody>
-          <a:bodyPr lIns="91425" tIns="91425" rIns="91425" bIns="91425" anchor="t" anchorCtr="0">
-            <a:noAutofit/>
-          </a:bodyPr>
-          <a:lstStyle/>
-          <a:p>
-            <a:pPr>
-              <a:spcBef>
-                <a:spcPts val="0"/>
-              </a:spcBef>
-              <a:buNone/>
-            </a:pPr>
-            <a:r>
-              <a:rPr lang="en" dirty="0" smtClean="0"/>
-              <a:t>Data acquisition timing: goal was to</a:t>
-            </a:r>
-            <a:r>
-              <a:rPr lang="en" baseline="0" dirty="0" smtClean="0"/>
-              <a:t> have the same time difference between stream and search for each tweet </a:t>
-            </a:r>
-            <a:r>
-              <a:rPr lang="en" baseline="0" dirty="0" smtClean="0">
-                <a:sym typeface="Wingdings" panose="05000000000000000000" pitchFamily="2" charset="2"/>
-              </a:rPr>
-              <a:t> infeasible due to API Rate Limits</a:t>
-            </a:r>
-            <a:endParaRPr lang="en" dirty="0"/>
-          </a:p>
-        </p:txBody>
-      </p:sp>
-    </p:spTree>
-    <p:extLst>
-      <p:ext uri="{BB962C8B-B14F-4D97-AF65-F5344CB8AC3E}">
-        <p14:creationId xmlns:p14="http://schemas.microsoft.com/office/powerpoint/2010/main" val="2817635170"/>
-      </p:ext>
-    </p:extLst>
-  </p:cSld>
-  <p:clrMapOvr>
-    <a:masterClrMapping/>
-  </p:clrMapOvr>
-</p:notes>
-</file>
-
-<file path=ppt/notesSlides/notesSlide9.xml><?xml version="1.0" encoding="utf-8"?>
-<p:notes xmlns:a="http://schemas.openxmlformats.org/drawingml/2006/main" xmlns:r="http://schemas.openxmlformats.org/officeDocument/2006/relationships" xmlns:p="http://schemas.openxmlformats.org/presentationml/2006/main" showMasterSp="0" showMasterPhAnim="0">
-  <p:cSld>
-    <p:spTree>
-      <p:nvGrpSpPr>
-        <p:cNvPr id="1" name="Shape 58"/>
-        <p:cNvGrpSpPr/>
-        <p:nvPr/>
-      </p:nvGrpSpPr>
-      <p:grpSpPr>
-        <a:xfrm>
-          <a:off x="0" y="0"/>
-          <a:ext cx="0" cy="0"/>
-          <a:chOff x="0" y="0"/>
-          <a:chExt cx="0" cy="0"/>
-        </a:xfrm>
-      </p:grpSpPr>
-      <p:sp>
-        <p:nvSpPr>
-          <p:cNvPr id="59" name="Shape 59"/>
-          <p:cNvSpPr>
-            <a:spLocks noGrp="1" noRot="1" noChangeAspect="1"/>
-          </p:cNvSpPr>
-          <p:nvPr>
-            <p:ph type="sldImg" idx="2"/>
-          </p:nvPr>
-        </p:nvSpPr>
-        <p:spPr>
-          <a:xfrm>
-            <a:off x="1143000" y="685800"/>
-            <a:ext cx="4572000" cy="3429000"/>
-          </a:xfrm>
-          <a:custGeom>
-            <a:avLst/>
-            <a:gdLst/>
-            <a:ahLst/>
-            <a:cxnLst/>
-            <a:rect l="0" t="0" r="0" b="0"/>
-            <a:pathLst>
-              <a:path w="120000" h="120000" extrusionOk="0">
-                <a:moveTo>
-                  <a:pt x="0" y="0"/>
-                </a:moveTo>
-                <a:lnTo>
-                  <a:pt x="120000" y="0"/>
-                </a:lnTo>
-                <a:lnTo>
-                  <a:pt x="120000" y="120000"/>
-                </a:lnTo>
-                <a:lnTo>
-                  <a:pt x="0" y="120000"/>
-                </a:lnTo>
-                <a:close/>
-              </a:path>
-            </a:pathLst>
-          </a:custGeom>
-          <a:noFill/>
-          <a:ln w="9525" cap="flat" cmpd="sng">
-            <a:solidFill>
-              <a:srgbClr val="000000"/>
-            </a:solidFill>
-            <a:prstDash val="solid"/>
-            <a:round/>
-            <a:headEnd type="none" w="med" len="med"/>
-            <a:tailEnd type="none" w="med" len="med"/>
-          </a:ln>
-        </p:spPr>
-      </p:sp>
-      <p:sp>
-        <p:nvSpPr>
-          <p:cNvPr id="60" name="Shape 60"/>
-          <p:cNvSpPr txBox="1">
-            <a:spLocks noGrp="1"/>
-          </p:cNvSpPr>
-          <p:nvPr>
-            <p:ph type="body" idx="1"/>
-          </p:nvPr>
-        </p:nvSpPr>
-        <p:spPr>
-          <a:xfrm>
-            <a:off x="685800" y="4343400"/>
-            <a:ext cx="5486399" cy="4114800"/>
-          </a:xfrm>
-          <a:prstGeom prst="rect">
-            <a:avLst/>
-          </a:prstGeom>
-        </p:spPr>
-        <p:txBody>
-          <a:bodyPr lIns="91425" tIns="91425" rIns="91425" bIns="91425" anchor="t" anchorCtr="0">
-            <a:noAutofit/>
-          </a:bodyPr>
-          <a:lstStyle/>
-          <a:p>
-            <a:pPr>
-              <a:spcBef>
-                <a:spcPts val="0"/>
-              </a:spcBef>
-              <a:buNone/>
-            </a:pPr>
-            <a:r>
-              <a:rPr lang="en" dirty="0" smtClean="0"/>
-              <a:t>Data acquisition timing: goal was to </a:t>
-            </a:r>
-            <a:endParaRPr lang="en" dirty="0"/>
-          </a:p>
-        </p:txBody>
-      </p:sp>
-    </p:spTree>
-    <p:extLst>
-      <p:ext uri="{BB962C8B-B14F-4D97-AF65-F5344CB8AC3E}">
-        <p14:creationId xmlns:p14="http://schemas.microsoft.com/office/powerpoint/2010/main" val="1009225503"/>
+        <p14:creationId xmlns:p14="http://schemas.microsoft.com/office/powerpoint/2010/main" val="4126501043"/>
       </p:ext>
     </p:extLst>
   </p:cSld>
@@ -2101,7 +1668,7 @@
               <a:pPr>
                 <a:defRPr/>
               </a:pPr>
-              <a:t>12/5/2015</a:t>
+              <a:t>12/7/2015</a:t>
             </a:fld>
             <a:endParaRPr lang="en-US"/>
           </a:p>
@@ -2430,7 +1997,7 @@
               <a:pPr>
                 <a:defRPr/>
               </a:pPr>
-              <a:t>12/5/2015</a:t>
+              <a:t>12/7/2015</a:t>
             </a:fld>
             <a:endParaRPr lang="en-US"/>
           </a:p>
@@ -2768,7 +2335,7 @@
               <a:pPr>
                 <a:defRPr/>
               </a:pPr>
-              <a:t>12/5/2015</a:t>
+              <a:t>12/7/2015</a:t>
             </a:fld>
             <a:endParaRPr lang="en-US"/>
           </a:p>
@@ -3236,7 +2803,7 @@
               <a:pPr>
                 <a:defRPr/>
               </a:pPr>
-              <a:t>12/5/2015</a:t>
+              <a:t>12/7/2015</a:t>
             </a:fld>
             <a:endParaRPr lang="en-US"/>
           </a:p>
@@ -3574,7 +3141,7 @@
               <a:pPr>
                 <a:defRPr/>
               </a:pPr>
-              <a:t>12/5/2015</a:t>
+              <a:t>12/7/2015</a:t>
             </a:fld>
             <a:endParaRPr lang="en-US"/>
           </a:p>
@@ -4294,167 +3861,6 @@
       <p:sp>
         <p:nvSpPr>
           <p:cNvPr id="39" name="Shape 39"/>
-          <p:cNvSpPr txBox="1">
-            <a:spLocks noGrp="1"/>
-          </p:cNvSpPr>
-          <p:nvPr>
-            <p:ph type="sldNum" idx="12"/>
-          </p:nvPr>
-        </p:nvSpPr>
-        <p:spPr>
-          <a:xfrm>
-            <a:off x="8472458" y="6217621"/>
-            <a:ext cx="548699" cy="524800"/>
-          </a:xfrm>
-          <a:prstGeom prst="rect">
-            <a:avLst/>
-          </a:prstGeom>
-        </p:spPr>
-        <p:txBody>
-          <a:bodyPr lIns="91425" tIns="91425" rIns="91425" bIns="91425" anchor="ctr" anchorCtr="0">
-            <a:noAutofit/>
-          </a:bodyPr>
-          <a:lstStyle/>
-          <a:p>
-            <a:pPr>
-              <a:spcBef>
-                <a:spcPts val="0"/>
-              </a:spcBef>
-              <a:buNone/>
-            </a:pPr>
-            <a:fld id="{00000000-1234-1234-1234-123412341234}" type="slidenum">
-              <a:rPr lang="en"/>
-              <a:pPr>
-                <a:spcBef>
-                  <a:spcPts val="0"/>
-                </a:spcBef>
-                <a:buNone/>
-              </a:pPr>
-              <a:t>‹#›</a:t>
-            </a:fld>
-            <a:endParaRPr lang="en"/>
-          </a:p>
-        </p:txBody>
-      </p:sp>
-    </p:spTree>
-  </p:cSld>
-  <p:clrMapOvr>
-    <a:masterClrMapping/>
-  </p:clrMapOvr>
-</p:sldLayout>
-</file>
-
-<file path=ppt/slideLayouts/slideLayout8.xml><?xml version="1.0" encoding="utf-8"?>
-<p:sldLayout xmlns:a="http://schemas.openxmlformats.org/drawingml/2006/main" xmlns:r="http://schemas.openxmlformats.org/officeDocument/2006/relationships" xmlns:p="http://schemas.openxmlformats.org/presentationml/2006/main" type="secHead">
-  <p:cSld name="Section title">
-    <p:spTree>
-      <p:nvGrpSpPr>
-        <p:cNvPr id="1" name="Shape 12"/>
-        <p:cNvGrpSpPr/>
-        <p:nvPr/>
-      </p:nvGrpSpPr>
-      <p:grpSpPr>
-        <a:xfrm>
-          <a:off x="0" y="0"/>
-          <a:ext cx="0" cy="0"/>
-          <a:chOff x="0" y="0"/>
-          <a:chExt cx="0" cy="0"/>
-        </a:xfrm>
-      </p:grpSpPr>
-      <p:sp>
-        <p:nvSpPr>
-          <p:cNvPr id="13" name="Shape 13"/>
-          <p:cNvSpPr txBox="1">
-            <a:spLocks noGrp="1"/>
-          </p:cNvSpPr>
-          <p:nvPr>
-            <p:ph type="title"/>
-          </p:nvPr>
-        </p:nvSpPr>
-        <p:spPr>
-          <a:xfrm>
-            <a:off x="311701" y="2867800"/>
-            <a:ext cx="8520599" cy="1122400"/>
-          </a:xfrm>
-          <a:prstGeom prst="rect">
-            <a:avLst/>
-          </a:prstGeom>
-        </p:spPr>
-        <p:txBody>
-          <a:bodyPr lIns="91425" tIns="91425" rIns="91425" bIns="91425" anchor="ctr" anchorCtr="0"/>
-          <a:lstStyle>
-            <a:lvl1pPr algn="ctr">
-              <a:spcBef>
-                <a:spcPts val="0"/>
-              </a:spcBef>
-              <a:buSzPct val="100000"/>
-              <a:defRPr sz="3600"/>
-            </a:lvl1pPr>
-            <a:lvl2pPr algn="ctr">
-              <a:spcBef>
-                <a:spcPts val="0"/>
-              </a:spcBef>
-              <a:buSzPct val="100000"/>
-              <a:defRPr sz="3600"/>
-            </a:lvl2pPr>
-            <a:lvl3pPr algn="ctr">
-              <a:spcBef>
-                <a:spcPts val="0"/>
-              </a:spcBef>
-              <a:buSzPct val="100000"/>
-              <a:defRPr sz="3600"/>
-            </a:lvl3pPr>
-            <a:lvl4pPr algn="ctr">
-              <a:spcBef>
-                <a:spcPts val="0"/>
-              </a:spcBef>
-              <a:buSzPct val="100000"/>
-              <a:defRPr sz="3600"/>
-            </a:lvl4pPr>
-            <a:lvl5pPr algn="ctr">
-              <a:spcBef>
-                <a:spcPts val="0"/>
-              </a:spcBef>
-              <a:buSzPct val="100000"/>
-              <a:defRPr sz="3600"/>
-            </a:lvl5pPr>
-            <a:lvl6pPr algn="ctr">
-              <a:spcBef>
-                <a:spcPts val="0"/>
-              </a:spcBef>
-              <a:buSzPct val="100000"/>
-              <a:defRPr sz="3600"/>
-            </a:lvl6pPr>
-            <a:lvl7pPr algn="ctr">
-              <a:spcBef>
-                <a:spcPts val="0"/>
-              </a:spcBef>
-              <a:buSzPct val="100000"/>
-              <a:defRPr sz="3600"/>
-            </a:lvl7pPr>
-            <a:lvl8pPr algn="ctr">
-              <a:spcBef>
-                <a:spcPts val="0"/>
-              </a:spcBef>
-              <a:buSzPct val="100000"/>
-              <a:defRPr sz="3600"/>
-            </a:lvl8pPr>
-            <a:lvl9pPr algn="ctr">
-              <a:spcBef>
-                <a:spcPts val="0"/>
-              </a:spcBef>
-              <a:buSzPct val="100000"/>
-              <a:defRPr sz="3600"/>
-            </a:lvl9pPr>
-          </a:lstStyle>
-          <a:p>
-            <a:endParaRPr/>
-          </a:p>
-        </p:txBody>
-      </p:sp>
-      <p:sp>
-        <p:nvSpPr>
-          <p:cNvPr id="14" name="Shape 14"/>
           <p:cNvSpPr txBox="1">
             <a:spLocks noGrp="1"/>
           </p:cNvSpPr>
@@ -4581,7 +3987,7 @@
               <a:pPr>
                 <a:defRPr/>
               </a:pPr>
-              <a:t>12/5/2015</a:t>
+              <a:t>12/7/2015</a:t>
             </a:fld>
             <a:endParaRPr lang="en-US" dirty="0"/>
           </a:p>
@@ -4709,7 +4115,7 @@
           <p:nvPr/>
         </p:nvPicPr>
         <p:blipFill>
-          <a:blip r:embed="rId10"/>
+          <a:blip r:embed="rId9"/>
           <a:stretch>
             <a:fillRect/>
           </a:stretch>
@@ -4733,7 +4139,7 @@
           <p:nvPr/>
         </p:nvPicPr>
         <p:blipFill>
-          <a:blip r:embed="rId11"/>
+          <a:blip r:embed="rId10"/>
           <a:stretch>
             <a:fillRect/>
           </a:stretch>
@@ -4759,7 +4165,6 @@
     <p:sldLayoutId id="2147483697" r:id="rId5"/>
     <p:sldLayoutId id="2147483699" r:id="rId6"/>
     <p:sldLayoutId id="2147483700" r:id="rId7"/>
-    <p:sldLayoutId id="2147483701" r:id="rId8"/>
   </p:sldLayoutIdLst>
   <p:txStyles>
     <p:titleStyle>
@@ -5361,502 +4766,13 @@
                   <a:schemeClr val="dk1"/>
                 </a:solidFill>
               </a:rPr>
-              <a:t>Fall 2015</a:t>
+              <a:t>7 December 2015</a:t>
             </a:r>
             <a:endParaRPr lang="en" sz="2000" dirty="0">
               <a:solidFill>
                 <a:schemeClr val="dk1"/>
               </a:solidFill>
             </a:endParaRPr>
-          </a:p>
-        </p:txBody>
-      </p:sp>
-    </p:spTree>
-  </p:cSld>
-  <p:clrMapOvr>
-    <a:masterClrMapping/>
-  </p:clrMapOvr>
-  <p:transition spd="slow">
-    <p:cut/>
-  </p:transition>
-  <p:timing>
-    <p:tnLst>
-      <p:par>
-        <p:cTn id="1" dur="indefinite" restart="never" nodeType="tmRoot"/>
-      </p:par>
-    </p:tnLst>
-  </p:timing>
-</p:sld>
-</file>
-
-<file path=ppt/slides/slide10.xml><?xml version="1.0" encoding="utf-8"?>
-<p:sld xmlns:a="http://schemas.openxmlformats.org/drawingml/2006/main" xmlns:r="http://schemas.openxmlformats.org/officeDocument/2006/relationships" xmlns:p="http://schemas.openxmlformats.org/presentationml/2006/main">
-  <p:cSld>
-    <p:spTree>
-      <p:nvGrpSpPr>
-        <p:cNvPr id="1" name=""/>
-        <p:cNvGrpSpPr/>
-        <p:nvPr/>
-      </p:nvGrpSpPr>
-      <p:grpSpPr>
-        <a:xfrm>
-          <a:off x="0" y="0"/>
-          <a:ext cx="0" cy="0"/>
-          <a:chOff x="0" y="0"/>
-          <a:chExt cx="0" cy="0"/>
-        </a:xfrm>
-      </p:grpSpPr>
-      <p:sp>
-        <p:nvSpPr>
-          <p:cNvPr id="4" name="Title 3"/>
-          <p:cNvSpPr>
-            <a:spLocks noGrp="1"/>
-          </p:cNvSpPr>
-          <p:nvPr>
-            <p:ph type="title"/>
-          </p:nvPr>
-        </p:nvSpPr>
-        <p:spPr/>
-        <p:txBody>
-          <a:bodyPr/>
-          <a:lstStyle/>
-          <a:p>
-            <a:r>
-              <a:rPr lang="en-US" dirty="0" smtClean="0"/>
-              <a:t>Results</a:t>
-            </a:r>
-            <a:endParaRPr lang="en-US" dirty="0"/>
-          </a:p>
-        </p:txBody>
-      </p:sp>
-    </p:spTree>
-    <p:extLst>
-      <p:ext uri="{BB962C8B-B14F-4D97-AF65-F5344CB8AC3E}">
-        <p14:creationId xmlns:p14="http://schemas.microsoft.com/office/powerpoint/2010/main" val="2357395734"/>
-      </p:ext>
-    </p:extLst>
-  </p:cSld>
-  <p:clrMapOvr>
-    <a:masterClrMapping/>
-  </p:clrMapOvr>
-</p:sld>
-</file>
-
-<file path=ppt/slides/slide11.xml><?xml version="1.0" encoding="utf-8"?>
-<p:sld xmlns:a="http://schemas.openxmlformats.org/drawingml/2006/main" xmlns:r="http://schemas.openxmlformats.org/officeDocument/2006/relationships" xmlns:p="http://schemas.openxmlformats.org/presentationml/2006/main">
-  <p:cSld>
-    <p:spTree>
-      <p:nvGrpSpPr>
-        <p:cNvPr id="1" name="Shape 55"/>
-        <p:cNvGrpSpPr/>
-        <p:nvPr/>
-      </p:nvGrpSpPr>
-      <p:grpSpPr>
-        <a:xfrm>
-          <a:off x="0" y="0"/>
-          <a:ext cx="0" cy="0"/>
-          <a:chOff x="0" y="0"/>
-          <a:chExt cx="0" cy="0"/>
-        </a:xfrm>
-      </p:grpSpPr>
-      <p:sp>
-        <p:nvSpPr>
-          <p:cNvPr id="56" name="Shape 56"/>
-          <p:cNvSpPr txBox="1">
-            <a:spLocks noGrp="1"/>
-          </p:cNvSpPr>
-          <p:nvPr>
-            <p:ph type="title"/>
-          </p:nvPr>
-        </p:nvSpPr>
-        <p:spPr>
-          <a:prstGeom prst="rect">
-            <a:avLst/>
-          </a:prstGeom>
-        </p:spPr>
-        <p:txBody>
-          <a:bodyPr lIns="91425" tIns="91425" rIns="91425" bIns="91425" anchor="t" anchorCtr="0">
-            <a:noAutofit/>
-          </a:bodyPr>
-          <a:lstStyle/>
-          <a:p>
-            <a:pPr algn="l">
-              <a:spcBef>
-                <a:spcPts val="0"/>
-              </a:spcBef>
-              <a:buNone/>
-            </a:pPr>
-            <a:r>
-              <a:rPr lang="en" sz="4000" dirty="0" smtClean="0"/>
-              <a:t>Limitations/Challenges</a:t>
-            </a:r>
-            <a:endParaRPr lang="en" sz="4000" dirty="0"/>
-          </a:p>
-        </p:txBody>
-      </p:sp>
-      <p:sp>
-        <p:nvSpPr>
-          <p:cNvPr id="57" name="Shape 57"/>
-          <p:cNvSpPr txBox="1">
-            <a:spLocks noGrp="1"/>
-          </p:cNvSpPr>
-          <p:nvPr>
-            <p:ph type="body" idx="1"/>
-          </p:nvPr>
-        </p:nvSpPr>
-        <p:spPr>
-          <a:prstGeom prst="rect">
-            <a:avLst/>
-          </a:prstGeom>
-        </p:spPr>
-        <p:txBody>
-          <a:bodyPr lIns="91425" tIns="91425" rIns="91425" bIns="91425" anchor="t" anchorCtr="0">
-            <a:noAutofit/>
-          </a:bodyPr>
-          <a:lstStyle/>
-          <a:p>
-            <a:pPr marL="457200" lvl="0" indent="-228600" rtl="0">
-              <a:lnSpc>
-                <a:spcPct val="100000"/>
-              </a:lnSpc>
-              <a:spcBef>
-                <a:spcPts val="0"/>
-              </a:spcBef>
-              <a:spcAft>
-                <a:spcPts val="800"/>
-              </a:spcAft>
-              <a:buChar char="●"/>
-            </a:pPr>
-            <a:r>
-              <a:rPr lang="en-US" sz="2000" dirty="0" smtClean="0"/>
-              <a:t>Data acquisition timing</a:t>
-            </a:r>
-          </a:p>
-          <a:p>
-            <a:pPr marL="857250" lvl="1" indent="-228600">
-              <a:spcAft>
-                <a:spcPts val="800"/>
-              </a:spcAft>
-              <a:buChar char="●"/>
-            </a:pPr>
-            <a:r>
-              <a:rPr lang="en" sz="1800" dirty="0" smtClean="0"/>
-              <a:t>Amount of time between the stream and subsequent search of Tweet had to be approximated for efficiency reasons</a:t>
-            </a:r>
-          </a:p>
-          <a:p>
-            <a:pPr marL="857250" lvl="1" indent="-228600">
-              <a:spcAft>
-                <a:spcPts val="800"/>
-              </a:spcAft>
-              <a:buChar char="●"/>
-            </a:pPr>
-            <a:r>
-              <a:rPr lang="en" sz="1800" dirty="0" smtClean="0"/>
-              <a:t>Search limited by the Twitter API Rate Limit (180 searches in 15 minutes)</a:t>
-            </a:r>
-          </a:p>
-          <a:p>
-            <a:pPr marL="857250" lvl="1" indent="-228600">
-              <a:spcAft>
-                <a:spcPts val="800"/>
-              </a:spcAft>
-              <a:buChar char="●"/>
-            </a:pPr>
-            <a:endParaRPr lang="en" sz="1400" dirty="0" smtClean="0"/>
-          </a:p>
-          <a:p>
-            <a:pPr marL="457200" lvl="0" indent="-228600" rtl="0">
-              <a:lnSpc>
-                <a:spcPct val="100000"/>
-              </a:lnSpc>
-              <a:spcBef>
-                <a:spcPts val="0"/>
-              </a:spcBef>
-              <a:spcAft>
-                <a:spcPts val="800"/>
-              </a:spcAft>
-              <a:buChar char="●"/>
-            </a:pPr>
-            <a:endParaRPr lang="en" sz="1800" dirty="0" smtClean="0"/>
-          </a:p>
-          <a:p>
-            <a:pPr marL="457200" lvl="0" indent="-228600" rtl="0">
-              <a:lnSpc>
-                <a:spcPct val="100000"/>
-              </a:lnSpc>
-              <a:spcBef>
-                <a:spcPts val="0"/>
-              </a:spcBef>
-              <a:spcAft>
-                <a:spcPts val="800"/>
-              </a:spcAft>
-              <a:buChar char="●"/>
-            </a:pPr>
-            <a:endParaRPr lang="en" sz="1800" dirty="0" smtClean="0"/>
-          </a:p>
-          <a:p>
-            <a:pPr marL="457200" lvl="0" indent="-228600" rtl="0">
-              <a:lnSpc>
-                <a:spcPct val="100000"/>
-              </a:lnSpc>
-              <a:spcBef>
-                <a:spcPts val="0"/>
-              </a:spcBef>
-              <a:spcAft>
-                <a:spcPts val="800"/>
-              </a:spcAft>
-              <a:buChar char="●"/>
-            </a:pPr>
-            <a:endParaRPr lang="en" sz="1800" dirty="0"/>
-          </a:p>
-        </p:txBody>
-      </p:sp>
-    </p:spTree>
-    <p:extLst>
-      <p:ext uri="{BB962C8B-B14F-4D97-AF65-F5344CB8AC3E}">
-        <p14:creationId xmlns:p14="http://schemas.microsoft.com/office/powerpoint/2010/main" val="2470193496"/>
-      </p:ext>
-    </p:extLst>
-  </p:cSld>
-  <p:clrMapOvr>
-    <a:masterClrMapping/>
-  </p:clrMapOvr>
-  <p:transition spd="slow">
-    <p:cut/>
-  </p:transition>
-  <p:timing>
-    <p:tnLst>
-      <p:par>
-        <p:cTn id="1" dur="indefinite" restart="never" nodeType="tmRoot"/>
-      </p:par>
-    </p:tnLst>
-  </p:timing>
-</p:sld>
-</file>
-
-<file path=ppt/slides/slide12.xml><?xml version="1.0" encoding="utf-8"?>
-<p:sld xmlns:a="http://schemas.openxmlformats.org/drawingml/2006/main" xmlns:r="http://schemas.openxmlformats.org/officeDocument/2006/relationships" xmlns:p="http://schemas.openxmlformats.org/presentationml/2006/main">
-  <p:cSld>
-    <p:spTree>
-      <p:nvGrpSpPr>
-        <p:cNvPr id="1" name="Shape 55"/>
-        <p:cNvGrpSpPr/>
-        <p:nvPr/>
-      </p:nvGrpSpPr>
-      <p:grpSpPr>
-        <a:xfrm>
-          <a:off x="0" y="0"/>
-          <a:ext cx="0" cy="0"/>
-          <a:chOff x="0" y="0"/>
-          <a:chExt cx="0" cy="0"/>
-        </a:xfrm>
-      </p:grpSpPr>
-      <p:sp>
-        <p:nvSpPr>
-          <p:cNvPr id="56" name="Shape 56"/>
-          <p:cNvSpPr txBox="1">
-            <a:spLocks noGrp="1"/>
-          </p:cNvSpPr>
-          <p:nvPr>
-            <p:ph type="title"/>
-          </p:nvPr>
-        </p:nvSpPr>
-        <p:spPr>
-          <a:prstGeom prst="rect">
-            <a:avLst/>
-          </a:prstGeom>
-        </p:spPr>
-        <p:txBody>
-          <a:bodyPr lIns="91425" tIns="91425" rIns="91425" bIns="91425" anchor="t" anchorCtr="0">
-            <a:noAutofit/>
-          </a:bodyPr>
-          <a:lstStyle/>
-          <a:p>
-            <a:pPr algn="l">
-              <a:spcBef>
-                <a:spcPts val="0"/>
-              </a:spcBef>
-              <a:buNone/>
-            </a:pPr>
-            <a:r>
-              <a:rPr lang="en" sz="4000" dirty="0" smtClean="0"/>
-              <a:t>Conclusions</a:t>
-            </a:r>
-            <a:endParaRPr lang="en" sz="4000" dirty="0"/>
-          </a:p>
-        </p:txBody>
-      </p:sp>
-      <p:sp>
-        <p:nvSpPr>
-          <p:cNvPr id="57" name="Shape 57"/>
-          <p:cNvSpPr txBox="1">
-            <a:spLocks noGrp="1"/>
-          </p:cNvSpPr>
-          <p:nvPr>
-            <p:ph type="body" idx="1"/>
-          </p:nvPr>
-        </p:nvSpPr>
-        <p:spPr>
-          <a:prstGeom prst="rect">
-            <a:avLst/>
-          </a:prstGeom>
-        </p:spPr>
-        <p:txBody>
-          <a:bodyPr lIns="91425" tIns="91425" rIns="91425" bIns="91425" anchor="t" anchorCtr="0">
-            <a:noAutofit/>
-          </a:bodyPr>
-          <a:lstStyle/>
-          <a:p>
-            <a:pPr marL="457200" lvl="0" indent="-228600" rtl="0">
-              <a:lnSpc>
-                <a:spcPct val="100000"/>
-              </a:lnSpc>
-              <a:spcBef>
-                <a:spcPts val="0"/>
-              </a:spcBef>
-              <a:spcAft>
-                <a:spcPts val="800"/>
-              </a:spcAft>
-              <a:buChar char="●"/>
-            </a:pPr>
-            <a:r>
-              <a:rPr lang="en-US" sz="2000" dirty="0" smtClean="0"/>
-              <a:t>TODO</a:t>
-            </a:r>
-            <a:endParaRPr lang="en" sz="1800" dirty="0" smtClean="0"/>
-          </a:p>
-          <a:p>
-            <a:pPr marL="857250" lvl="1" indent="-228600">
-              <a:spcAft>
-                <a:spcPts val="800"/>
-              </a:spcAft>
-              <a:buChar char="●"/>
-            </a:pPr>
-            <a:endParaRPr lang="en" sz="1400" dirty="0" smtClean="0"/>
-          </a:p>
-          <a:p>
-            <a:pPr marL="457200" lvl="0" indent="-228600" rtl="0">
-              <a:lnSpc>
-                <a:spcPct val="100000"/>
-              </a:lnSpc>
-              <a:spcBef>
-                <a:spcPts val="0"/>
-              </a:spcBef>
-              <a:spcAft>
-                <a:spcPts val="800"/>
-              </a:spcAft>
-              <a:buChar char="●"/>
-            </a:pPr>
-            <a:endParaRPr lang="en" sz="1800" dirty="0" smtClean="0"/>
-          </a:p>
-          <a:p>
-            <a:pPr marL="457200" lvl="0" indent="-228600" rtl="0">
-              <a:lnSpc>
-                <a:spcPct val="100000"/>
-              </a:lnSpc>
-              <a:spcBef>
-                <a:spcPts val="0"/>
-              </a:spcBef>
-              <a:spcAft>
-                <a:spcPts val="800"/>
-              </a:spcAft>
-              <a:buChar char="●"/>
-            </a:pPr>
-            <a:endParaRPr lang="en" sz="1800" dirty="0" smtClean="0"/>
-          </a:p>
-          <a:p>
-            <a:pPr marL="457200" lvl="0" indent="-228600" rtl="0">
-              <a:lnSpc>
-                <a:spcPct val="100000"/>
-              </a:lnSpc>
-              <a:spcBef>
-                <a:spcPts val="0"/>
-              </a:spcBef>
-              <a:spcAft>
-                <a:spcPts val="800"/>
-              </a:spcAft>
-              <a:buChar char="●"/>
-            </a:pPr>
-            <a:endParaRPr lang="en" sz="1800" dirty="0"/>
-          </a:p>
-        </p:txBody>
-      </p:sp>
-    </p:spTree>
-    <p:extLst>
-      <p:ext uri="{BB962C8B-B14F-4D97-AF65-F5344CB8AC3E}">
-        <p14:creationId xmlns:p14="http://schemas.microsoft.com/office/powerpoint/2010/main" val="2780684317"/>
-      </p:ext>
-    </p:extLst>
-  </p:cSld>
-  <p:clrMapOvr>
-    <a:masterClrMapping/>
-  </p:clrMapOvr>
-  <p:transition spd="slow">
-    <p:cut/>
-  </p:transition>
-  <p:timing>
-    <p:tnLst>
-      <p:par>
-        <p:cTn id="1" dur="indefinite" restart="never" nodeType="tmRoot"/>
-      </p:par>
-    </p:tnLst>
-  </p:timing>
-</p:sld>
-</file>
-
-<file path=ppt/slides/slide13.xml><?xml version="1.0" encoding="utf-8"?>
-<p:sld xmlns:a="http://schemas.openxmlformats.org/drawingml/2006/main" xmlns:r="http://schemas.openxmlformats.org/officeDocument/2006/relationships" xmlns:p="http://schemas.openxmlformats.org/presentationml/2006/main">
-  <p:cSld>
-    <p:spTree>
-      <p:nvGrpSpPr>
-        <p:cNvPr id="1" name="Shape 179"/>
-        <p:cNvGrpSpPr/>
-        <p:nvPr/>
-      </p:nvGrpSpPr>
-      <p:grpSpPr>
-        <a:xfrm>
-          <a:off x="0" y="0"/>
-          <a:ext cx="0" cy="0"/>
-          <a:chOff x="0" y="0"/>
-          <a:chExt cx="0" cy="0"/>
-        </a:xfrm>
-      </p:grpSpPr>
-      <p:sp>
-        <p:nvSpPr>
-          <p:cNvPr id="180" name="Shape 180"/>
-          <p:cNvSpPr txBox="1">
-            <a:spLocks noGrp="1"/>
-          </p:cNvSpPr>
-          <p:nvPr>
-            <p:ph type="title"/>
-          </p:nvPr>
-        </p:nvSpPr>
-        <p:spPr>
-          <a:xfrm>
-            <a:off x="311701" y="2867800"/>
-            <a:ext cx="8520599" cy="1122400"/>
-          </a:xfrm>
-          <a:prstGeom prst="rect">
-            <a:avLst/>
-          </a:prstGeom>
-        </p:spPr>
-        <p:txBody>
-          <a:bodyPr lIns="91425" tIns="91425" rIns="91425" bIns="91425" anchor="ctr" anchorCtr="0">
-            <a:noAutofit/>
-          </a:bodyPr>
-          <a:lstStyle/>
-          <a:p>
-            <a:pPr>
-              <a:spcBef>
-                <a:spcPts val="0"/>
-              </a:spcBef>
-              <a:buNone/>
-            </a:pPr>
-            <a:r>
-              <a:rPr lang="en" sz="4400" dirty="0"/>
-              <a:t>Questions?</a:t>
-            </a:r>
           </a:p>
         </p:txBody>
       </p:sp>
@@ -5883,286 +4799,6 @@
   <p:cSld>
     <p:spTree>
       <p:nvGrpSpPr>
-        <p:cNvPr id="1" name="Shape 55"/>
-        <p:cNvGrpSpPr/>
-        <p:nvPr/>
-      </p:nvGrpSpPr>
-      <p:grpSpPr>
-        <a:xfrm>
-          <a:off x="0" y="0"/>
-          <a:ext cx="0" cy="0"/>
-          <a:chOff x="0" y="0"/>
-          <a:chExt cx="0" cy="0"/>
-        </a:xfrm>
-      </p:grpSpPr>
-      <p:sp>
-        <p:nvSpPr>
-          <p:cNvPr id="56" name="Shape 56"/>
-          <p:cNvSpPr txBox="1">
-            <a:spLocks noGrp="1"/>
-          </p:cNvSpPr>
-          <p:nvPr>
-            <p:ph type="title"/>
-          </p:nvPr>
-        </p:nvSpPr>
-        <p:spPr>
-          <a:prstGeom prst="rect">
-            <a:avLst/>
-          </a:prstGeom>
-        </p:spPr>
-        <p:txBody>
-          <a:bodyPr lIns="91425" tIns="91425" rIns="91425" bIns="91425" anchor="t" anchorCtr="0">
-            <a:noAutofit/>
-          </a:bodyPr>
-          <a:lstStyle/>
-          <a:p>
-            <a:pPr algn="l">
-              <a:spcBef>
-                <a:spcPts val="0"/>
-              </a:spcBef>
-              <a:buNone/>
-            </a:pPr>
-            <a:r>
-              <a:rPr lang="en" sz="4000" dirty="0" smtClean="0"/>
-              <a:t>Agenda</a:t>
-            </a:r>
-            <a:endParaRPr lang="en" sz="4000" dirty="0"/>
-          </a:p>
-        </p:txBody>
-      </p:sp>
-      <p:sp>
-        <p:nvSpPr>
-          <p:cNvPr id="57" name="Shape 57"/>
-          <p:cNvSpPr txBox="1">
-            <a:spLocks noGrp="1"/>
-          </p:cNvSpPr>
-          <p:nvPr>
-            <p:ph type="body" idx="1"/>
-          </p:nvPr>
-        </p:nvSpPr>
-        <p:spPr>
-          <a:prstGeom prst="rect">
-            <a:avLst/>
-          </a:prstGeom>
-        </p:spPr>
-        <p:txBody>
-          <a:bodyPr lIns="91425" tIns="91425" rIns="91425" bIns="91425" anchor="t" anchorCtr="0">
-            <a:noAutofit/>
-          </a:bodyPr>
-          <a:lstStyle/>
-          <a:p>
-            <a:pPr marL="457200" lvl="0" indent="-228600" rtl="0">
-              <a:lnSpc>
-                <a:spcPct val="100000"/>
-              </a:lnSpc>
-              <a:spcBef>
-                <a:spcPts val="0"/>
-              </a:spcBef>
-              <a:spcAft>
-                <a:spcPts val="800"/>
-              </a:spcAft>
-              <a:buChar char="●"/>
-            </a:pPr>
-            <a:r>
-              <a:rPr lang="en-US" sz="2000" dirty="0" smtClean="0"/>
-              <a:t>Research Question</a:t>
-            </a:r>
-          </a:p>
-          <a:p>
-            <a:pPr marL="457200" lvl="0" indent="-228600" rtl="0">
-              <a:lnSpc>
-                <a:spcPct val="100000"/>
-              </a:lnSpc>
-              <a:spcBef>
-                <a:spcPts val="0"/>
-              </a:spcBef>
-              <a:spcAft>
-                <a:spcPts val="800"/>
-              </a:spcAft>
-              <a:buChar char="●"/>
-            </a:pPr>
-            <a:r>
-              <a:rPr lang="en-US" sz="2000" dirty="0" smtClean="0"/>
-              <a:t>Data Acquisition and Dataset Statistics</a:t>
-            </a:r>
-          </a:p>
-          <a:p>
-            <a:pPr marL="857250" lvl="1" indent="-228600">
-              <a:spcAft>
-                <a:spcPts val="800"/>
-              </a:spcAft>
-              <a:buChar char="●"/>
-            </a:pPr>
-            <a:r>
-              <a:rPr lang="en-US" sz="1800" dirty="0" smtClean="0"/>
-              <a:t>PHP Programs and Manual Preprocessing</a:t>
-            </a:r>
-          </a:p>
-          <a:p>
-            <a:pPr marL="857250" lvl="1" indent="-228600">
-              <a:spcAft>
-                <a:spcPts val="800"/>
-              </a:spcAft>
-              <a:buChar char="●"/>
-            </a:pPr>
-            <a:r>
-              <a:rPr lang="en-US" sz="1800" dirty="0" smtClean="0"/>
-              <a:t>Data Labeling</a:t>
-            </a:r>
-          </a:p>
-          <a:p>
-            <a:pPr marL="457200" indent="-228600">
-              <a:spcAft>
-                <a:spcPts val="800"/>
-              </a:spcAft>
-              <a:buChar char="●"/>
-            </a:pPr>
-            <a:r>
-              <a:rPr lang="en-US" sz="2000" dirty="0" smtClean="0"/>
-              <a:t>Predictive Model and Test</a:t>
-            </a:r>
-          </a:p>
-          <a:p>
-            <a:pPr marL="857250" lvl="1" indent="-228600">
-              <a:spcAft>
-                <a:spcPts val="800"/>
-              </a:spcAft>
-              <a:buChar char="●"/>
-            </a:pPr>
-            <a:r>
-              <a:rPr lang="en-US" sz="1600" dirty="0" err="1" smtClean="0"/>
-              <a:t>Predictand</a:t>
-            </a:r>
-            <a:r>
-              <a:rPr lang="en-US" sz="1600" dirty="0" smtClean="0"/>
-              <a:t> Feature</a:t>
-            </a:r>
-            <a:endParaRPr lang="en-US" sz="1600" dirty="0"/>
-          </a:p>
-          <a:p>
-            <a:pPr marL="857250" lvl="1" indent="-228600">
-              <a:spcAft>
-                <a:spcPts val="800"/>
-              </a:spcAft>
-              <a:buChar char="●"/>
-            </a:pPr>
-            <a:r>
-              <a:rPr lang="en-US" sz="1600" dirty="0" smtClean="0"/>
-              <a:t>Implementation</a:t>
-            </a:r>
-          </a:p>
-          <a:p>
-            <a:pPr marL="457200" indent="-228600">
-              <a:spcAft>
-                <a:spcPts val="800"/>
-              </a:spcAft>
-              <a:buChar char="●"/>
-            </a:pPr>
-            <a:r>
-              <a:rPr lang="en-US" sz="2000" dirty="0" smtClean="0"/>
-              <a:t>Results</a:t>
-            </a:r>
-          </a:p>
-          <a:p>
-            <a:pPr marL="457200" indent="-228600">
-              <a:spcAft>
-                <a:spcPts val="800"/>
-              </a:spcAft>
-              <a:buChar char="●"/>
-            </a:pPr>
-            <a:r>
-              <a:rPr lang="en-US" sz="2000" dirty="0" smtClean="0"/>
-              <a:t>Conclusion</a:t>
-            </a:r>
-          </a:p>
-          <a:p>
-            <a:pPr marL="857250" lvl="1" indent="-228600">
-              <a:spcAft>
-                <a:spcPts val="800"/>
-              </a:spcAft>
-              <a:buChar char="●"/>
-            </a:pPr>
-            <a:endParaRPr lang="en" sz="1800" dirty="0" smtClean="0"/>
-          </a:p>
-          <a:p>
-            <a:pPr marL="857250" lvl="1" indent="-228600">
-              <a:spcAft>
-                <a:spcPts val="800"/>
-              </a:spcAft>
-              <a:buChar char="●"/>
-            </a:pPr>
-            <a:endParaRPr lang="en" sz="1400" dirty="0" smtClean="0"/>
-          </a:p>
-          <a:p>
-            <a:pPr marL="457200" lvl="0" indent="-228600" rtl="0">
-              <a:lnSpc>
-                <a:spcPct val="100000"/>
-              </a:lnSpc>
-              <a:spcBef>
-                <a:spcPts val="0"/>
-              </a:spcBef>
-              <a:spcAft>
-                <a:spcPts val="800"/>
-              </a:spcAft>
-              <a:buChar char="●"/>
-            </a:pPr>
-            <a:endParaRPr lang="en" sz="1800" dirty="0" smtClean="0"/>
-          </a:p>
-          <a:p>
-            <a:pPr marL="457200" lvl="0" indent="-228600" rtl="0">
-              <a:lnSpc>
-                <a:spcPct val="100000"/>
-              </a:lnSpc>
-              <a:spcBef>
-                <a:spcPts val="0"/>
-              </a:spcBef>
-              <a:spcAft>
-                <a:spcPts val="800"/>
-              </a:spcAft>
-              <a:buChar char="●"/>
-            </a:pPr>
-            <a:endParaRPr lang="en" sz="1800" dirty="0" smtClean="0"/>
-          </a:p>
-          <a:p>
-            <a:pPr marL="457200" lvl="0" indent="-228600" rtl="0">
-              <a:lnSpc>
-                <a:spcPct val="100000"/>
-              </a:lnSpc>
-              <a:spcBef>
-                <a:spcPts val="0"/>
-              </a:spcBef>
-              <a:spcAft>
-                <a:spcPts val="800"/>
-              </a:spcAft>
-              <a:buChar char="●"/>
-            </a:pPr>
-            <a:endParaRPr lang="en" sz="1800" dirty="0"/>
-          </a:p>
-        </p:txBody>
-      </p:sp>
-    </p:spTree>
-  </p:cSld>
-  <p:clrMapOvr>
-    <a:masterClrMapping/>
-  </p:clrMapOvr>
-  <p:transition spd="slow">
-    <p:cut/>
-  </p:transition>
-  <p:timing>
-    <p:tnLst>
-      <p:par>
-        <p:cTn id="1" dur="indefinite" restart="never" nodeType="tmRoot"/>
-      </p:par>
-    </p:tnLst>
-  </p:timing>
-</p:sld>
-</file>
-
-<file path=ppt/slides/slide3.xml><?xml version="1.0" encoding="utf-8"?>
-<p:sld xmlns:a="http://schemas.openxmlformats.org/drawingml/2006/main" xmlns:r="http://schemas.openxmlformats.org/officeDocument/2006/relationships" xmlns:p="http://schemas.openxmlformats.org/presentationml/2006/main">
-  <p:cSld>
-    <p:spTree>
-      <p:nvGrpSpPr>
         <p:cNvPr id="1" name=""/>
         <p:cNvGrpSpPr/>
         <p:nvPr/>
@@ -6215,8 +4851,8 @@
         </p:nvSpPr>
         <p:spPr>
           <a:xfrm>
-            <a:off x="1" y="2214880"/>
-            <a:ext cx="4490719" cy="2681673"/>
+            <a:off x="0" y="2511748"/>
+            <a:ext cx="4490719" cy="1618566"/>
           </a:xfrm>
         </p:spPr>
         <p:txBody>
@@ -6226,7 +4862,7 @@
             <a:pPr indent="0" algn="l"/>
             <a:r>
               <a:rPr lang="en-US" sz="2800" dirty="0" smtClean="0"/>
-              <a:t>What features of a Tweet contribute most to its popularity in terms of number of retweets and number of favorites?</a:t>
+              <a:t>What features of a Tweet contribute most to its popularity?</a:t>
             </a:r>
             <a:endParaRPr lang="en-US" sz="2800" dirty="0"/>
           </a:p>
@@ -6283,15 +4919,22 @@
   <p:clrMapOvr>
     <a:masterClrMapping/>
   </p:clrMapOvr>
+  <p:timing>
+    <p:tnLst>
+      <p:par>
+        <p:cTn id="1" dur="indefinite" restart="never" nodeType="tmRoot"/>
+      </p:par>
+    </p:tnLst>
+  </p:timing>
 </p:sld>
 </file>
 
-<file path=ppt/slides/slide4.xml><?xml version="1.0" encoding="utf-8"?>
+<file path=ppt/slides/slide3.xml><?xml version="1.0" encoding="utf-8"?>
 <p:sld xmlns:a="http://schemas.openxmlformats.org/drawingml/2006/main" xmlns:r="http://schemas.openxmlformats.org/officeDocument/2006/relationships" xmlns:p="http://schemas.openxmlformats.org/presentationml/2006/main">
   <p:cSld>
     <p:spTree>
       <p:nvGrpSpPr>
-        <p:cNvPr id="1" name=""/>
+        <p:cNvPr id="1" name="Shape 55"/>
         <p:cNvGrpSpPr/>
         <p:nvPr/>
       </p:nvGrpSpPr>
@@ -6305,44 +4948,403 @@
       </p:grpSpPr>
       <p:sp>
         <p:nvSpPr>
-          <p:cNvPr id="4" name="Title 3"/>
-          <p:cNvSpPr>
+          <p:cNvPr id="56" name="Shape 56"/>
+          <p:cNvSpPr txBox="1">
             <a:spLocks noGrp="1"/>
           </p:cNvSpPr>
           <p:nvPr>
             <p:ph type="title"/>
           </p:nvPr>
         </p:nvSpPr>
-        <p:spPr/>
+        <p:spPr>
+          <a:prstGeom prst="rect">
+            <a:avLst/>
+          </a:prstGeom>
+        </p:spPr>
         <p:txBody>
-          <a:bodyPr/>
+          <a:bodyPr lIns="91425" tIns="91425" rIns="91425" bIns="91425" anchor="t" anchorCtr="0">
+            <a:noAutofit/>
+          </a:bodyPr>
           <a:lstStyle/>
           <a:p>
-            <a:r>
-              <a:rPr lang="en-US" dirty="0" smtClean="0"/>
-              <a:t>Data Acquisition and </a:t>
-            </a:r>
-            <a:br>
-              <a:rPr lang="en-US" dirty="0" smtClean="0"/>
-            </a:br>
-            <a:r>
-              <a:rPr lang="en-US" dirty="0" smtClean="0"/>
-              <a:t>Dataset Statistics</a:t>
-            </a:r>
-            <a:endParaRPr lang="en-US" dirty="0"/>
+            <a:pPr algn="l">
+              <a:spcBef>
+                <a:spcPts val="0"/>
+              </a:spcBef>
+              <a:buNone/>
+            </a:pPr>
+            <a:r>
+              <a:rPr lang="en" sz="4000" dirty="0" smtClean="0"/>
+              <a:t>Data Collection and Preprocessing</a:t>
+            </a:r>
+            <a:endParaRPr lang="en" sz="4000" dirty="0"/>
+          </a:p>
+        </p:txBody>
+      </p:sp>
+      <p:sp>
+        <p:nvSpPr>
+          <p:cNvPr id="57" name="Shape 57"/>
+          <p:cNvSpPr txBox="1">
+            <a:spLocks noGrp="1"/>
+          </p:cNvSpPr>
+          <p:nvPr>
+            <p:ph type="body" idx="1"/>
+          </p:nvPr>
+        </p:nvSpPr>
+        <p:spPr>
+          <a:prstGeom prst="rect">
+            <a:avLst/>
+          </a:prstGeom>
+        </p:spPr>
+        <p:txBody>
+          <a:bodyPr lIns="91425" tIns="91425" rIns="91425" bIns="91425" anchor="t" anchorCtr="0">
+            <a:noAutofit/>
+          </a:bodyPr>
+          <a:lstStyle/>
+          <a:p>
+            <a:pPr marL="457200" lvl="0" indent="-228600" rtl="0">
+              <a:lnSpc>
+                <a:spcPct val="100000"/>
+              </a:lnSpc>
+              <a:spcBef>
+                <a:spcPts val="0"/>
+              </a:spcBef>
+              <a:spcAft>
+                <a:spcPts val="800"/>
+              </a:spcAft>
+              <a:buChar char="●"/>
+            </a:pPr>
+            <a:r>
+              <a:rPr lang="en-US" sz="2000" smtClean="0"/>
+              <a:t>Creation of 2 PHP </a:t>
+            </a:r>
+            <a:r>
+              <a:rPr lang="en-US" sz="2000" dirty="0" smtClean="0"/>
+              <a:t>Programs for interaction </a:t>
+            </a:r>
+            <a:r>
+              <a:rPr lang="en-US" sz="2000" dirty="0" smtClean="0"/>
+              <a:t>with the Public Stream </a:t>
+            </a:r>
+            <a:r>
+              <a:rPr lang="en-US" sz="2000" dirty="0" smtClean="0"/>
+              <a:t>and Search APIs</a:t>
+            </a:r>
+            <a:endParaRPr lang="en-US" sz="2000" dirty="0" smtClean="0"/>
+          </a:p>
+          <a:p>
+            <a:pPr marL="457200" lvl="0" indent="-228600" rtl="0">
+              <a:lnSpc>
+                <a:spcPct val="100000"/>
+              </a:lnSpc>
+              <a:spcBef>
+                <a:spcPts val="0"/>
+              </a:spcBef>
+              <a:spcAft>
+                <a:spcPts val="800"/>
+              </a:spcAft>
+              <a:buChar char="●"/>
+            </a:pPr>
+            <a:r>
+              <a:rPr lang="en-US" sz="2000" dirty="0" smtClean="0"/>
+              <a:t>Strea</a:t>
+            </a:r>
+            <a:r>
+              <a:rPr lang="en-US" sz="2000" dirty="0" smtClean="0"/>
+              <a:t>ming program:</a:t>
+            </a:r>
+          </a:p>
+          <a:p>
+            <a:pPr marL="857250" lvl="1" indent="-228600">
+              <a:spcAft>
+                <a:spcPts val="800"/>
+              </a:spcAft>
+              <a:buChar char="●"/>
+            </a:pPr>
+            <a:r>
+              <a:rPr lang="en-US" sz="1800" dirty="0" smtClean="0"/>
+              <a:t>Outputs a CSV file with the chosen attributes for each Tweet</a:t>
+            </a:r>
+          </a:p>
+          <a:p>
+            <a:pPr marL="857250" lvl="1" indent="-228600">
+              <a:spcAft>
+                <a:spcPts val="800"/>
+              </a:spcAft>
+              <a:buChar char="●"/>
+            </a:pPr>
+            <a:r>
+              <a:rPr lang="en-US" sz="1800" dirty="0" smtClean="0"/>
+              <a:t>Preprocessing:</a:t>
+            </a:r>
+            <a:endParaRPr lang="en-US" sz="1800" dirty="0" smtClean="0"/>
+          </a:p>
+          <a:p>
+            <a:pPr marL="1257300" lvl="2">
+              <a:spcAft>
+                <a:spcPts val="800"/>
+              </a:spcAft>
+              <a:buChar char="●"/>
+            </a:pPr>
+            <a:r>
+              <a:rPr lang="en-US" sz="1600" dirty="0" smtClean="0"/>
+              <a:t>Creation of an array of the most popular hashtags for </a:t>
+            </a:r>
+            <a:r>
+              <a:rPr lang="en-US" sz="1600" dirty="0" smtClean="0"/>
+              <a:t>additional (manual) </a:t>
+            </a:r>
+            <a:r>
+              <a:rPr lang="en-US" sz="1600" dirty="0" smtClean="0"/>
+              <a:t>feature analysis</a:t>
+            </a:r>
+          </a:p>
+          <a:p>
+            <a:pPr marL="1257300" lvl="2">
+              <a:spcAft>
+                <a:spcPts val="800"/>
+              </a:spcAft>
+              <a:buChar char="●"/>
+            </a:pPr>
+            <a:r>
+              <a:rPr lang="en-US" sz="1600" dirty="0" smtClean="0"/>
+              <a:t>Removal of commas (in order to use a CSV file output format)</a:t>
+            </a:r>
+          </a:p>
+          <a:p>
+            <a:pPr marL="1257300" lvl="2">
+              <a:spcAft>
+                <a:spcPts val="800"/>
+              </a:spcAft>
+              <a:buChar char="●"/>
+            </a:pPr>
+            <a:r>
+              <a:rPr lang="en" sz="1600" dirty="0" smtClean="0"/>
+              <a:t>Generation of Binary or Integer Count attributes from String </a:t>
+            </a:r>
+            <a:r>
+              <a:rPr lang="en" sz="1600" dirty="0" smtClean="0"/>
+              <a:t>features</a:t>
+            </a:r>
+          </a:p>
+          <a:p>
+            <a:pPr marL="457200" lvl="0" indent="-228600">
+              <a:spcAft>
+                <a:spcPts val="800"/>
+              </a:spcAft>
+              <a:buFont typeface="Arial" charset="0"/>
+              <a:buChar char="●"/>
+            </a:pPr>
+            <a:r>
+              <a:rPr lang="en-US" sz="1800" dirty="0" smtClean="0"/>
+              <a:t>Searches at </a:t>
+            </a:r>
+            <a:r>
+              <a:rPr lang="en-US" sz="1800" dirty="0"/>
+              <a:t>10 minutes, 30 minutes, 1 hour, and 20 hours after every data </a:t>
+            </a:r>
+            <a:r>
+              <a:rPr lang="en-US" sz="1800" dirty="0" smtClean="0"/>
+              <a:t>collection to collect Retweet and Favorite count information</a:t>
+            </a:r>
+            <a:endParaRPr lang="en-US" sz="1800" dirty="0"/>
           </a:p>
         </p:txBody>
       </p:sp>
     </p:spTree>
     <p:extLst>
       <p:ext uri="{BB962C8B-B14F-4D97-AF65-F5344CB8AC3E}">
-        <p14:creationId xmlns:p14="http://schemas.microsoft.com/office/powerpoint/2010/main" val="582118615"/>
+        <p14:creationId xmlns:p14="http://schemas.microsoft.com/office/powerpoint/2010/main" val="4246482323"/>
       </p:ext>
     </p:extLst>
   </p:cSld>
   <p:clrMapOvr>
     <a:masterClrMapping/>
   </p:clrMapOvr>
+  <p:transition spd="slow">
+    <p:cut/>
+  </p:transition>
+  <p:timing>
+    <p:tnLst>
+      <p:par>
+        <p:cTn id="1" dur="indefinite" restart="never" nodeType="tmRoot"/>
+      </p:par>
+    </p:tnLst>
+  </p:timing>
+</p:sld>
+</file>
+
+<file path=ppt/slides/slide4.xml><?xml version="1.0" encoding="utf-8"?>
+<p:sld xmlns:a="http://schemas.openxmlformats.org/drawingml/2006/main" xmlns:r="http://schemas.openxmlformats.org/officeDocument/2006/relationships" xmlns:p="http://schemas.openxmlformats.org/presentationml/2006/main">
+  <p:cSld>
+    <p:spTree>
+      <p:nvGrpSpPr>
+        <p:cNvPr id="1" name="Shape 55"/>
+        <p:cNvGrpSpPr/>
+        <p:nvPr/>
+      </p:nvGrpSpPr>
+      <p:grpSpPr>
+        <a:xfrm>
+          <a:off x="0" y="0"/>
+          <a:ext cx="0" cy="0"/>
+          <a:chOff x="0" y="0"/>
+          <a:chExt cx="0" cy="0"/>
+        </a:xfrm>
+      </p:grpSpPr>
+      <p:sp>
+        <p:nvSpPr>
+          <p:cNvPr id="56" name="Shape 56"/>
+          <p:cNvSpPr txBox="1">
+            <a:spLocks noGrp="1"/>
+          </p:cNvSpPr>
+          <p:nvPr>
+            <p:ph type="title"/>
+          </p:nvPr>
+        </p:nvSpPr>
+        <p:spPr>
+          <a:prstGeom prst="rect">
+            <a:avLst/>
+          </a:prstGeom>
+        </p:spPr>
+        <p:txBody>
+          <a:bodyPr lIns="91425" tIns="91425" rIns="91425" bIns="91425" anchor="t" anchorCtr="0">
+            <a:noAutofit/>
+          </a:bodyPr>
+          <a:lstStyle/>
+          <a:p>
+            <a:pPr algn="l">
+              <a:spcBef>
+                <a:spcPts val="0"/>
+              </a:spcBef>
+              <a:buNone/>
+            </a:pPr>
+            <a:r>
+              <a:rPr lang="en" sz="4000" dirty="0" smtClean="0"/>
+              <a:t>The Dataset</a:t>
+            </a:r>
+            <a:endParaRPr lang="en" sz="4000" dirty="0"/>
+          </a:p>
+        </p:txBody>
+      </p:sp>
+      <p:sp>
+        <p:nvSpPr>
+          <p:cNvPr id="57" name="Shape 57"/>
+          <p:cNvSpPr txBox="1">
+            <a:spLocks noGrp="1"/>
+          </p:cNvSpPr>
+          <p:nvPr>
+            <p:ph type="body" idx="1"/>
+          </p:nvPr>
+        </p:nvSpPr>
+        <p:spPr>
+          <a:prstGeom prst="rect">
+            <a:avLst/>
+          </a:prstGeom>
+        </p:spPr>
+        <p:txBody>
+          <a:bodyPr lIns="91425" tIns="91425" rIns="91425" bIns="91425" anchor="t" anchorCtr="0">
+            <a:noAutofit/>
+          </a:bodyPr>
+          <a:lstStyle/>
+          <a:p>
+            <a:pPr marL="457200" lvl="0" indent="-228600" rtl="0">
+              <a:lnSpc>
+                <a:spcPct val="100000"/>
+              </a:lnSpc>
+              <a:spcBef>
+                <a:spcPts val="0"/>
+              </a:spcBef>
+              <a:spcAft>
+                <a:spcPts val="800"/>
+              </a:spcAft>
+              <a:buChar char="●"/>
+            </a:pPr>
+            <a:r>
+              <a:rPr lang="en-US" sz="2000" dirty="0" smtClean="0"/>
+              <a:t>Total number of Tweets used:</a:t>
+            </a:r>
+          </a:p>
+          <a:p>
+            <a:pPr marL="857250" lvl="1" indent="-228600">
+              <a:spcAft>
+                <a:spcPts val="800"/>
+              </a:spcAft>
+              <a:buChar char="●"/>
+            </a:pPr>
+            <a:r>
+              <a:rPr lang="en-US" sz="1800" dirty="0" smtClean="0"/>
+              <a:t>Size of training data:</a:t>
+            </a:r>
+          </a:p>
+          <a:p>
+            <a:pPr marL="857250" lvl="1" indent="-228600">
+              <a:spcAft>
+                <a:spcPts val="800"/>
+              </a:spcAft>
+              <a:buChar char="●"/>
+            </a:pPr>
+            <a:r>
+              <a:rPr lang="en-US" sz="1800" dirty="0" smtClean="0"/>
+              <a:t>Size of validation data:</a:t>
+            </a:r>
+          </a:p>
+          <a:p>
+            <a:pPr marL="457200" indent="-228600">
+              <a:spcAft>
+                <a:spcPts val="800"/>
+              </a:spcAft>
+              <a:buChar char="●"/>
+            </a:pPr>
+            <a:r>
+              <a:rPr lang="en-US" sz="2000" dirty="0" smtClean="0"/>
+              <a:t>Target Attribute:</a:t>
+            </a:r>
+          </a:p>
+          <a:p>
+            <a:pPr marL="457200" lvl="0" indent="-228600" rtl="0">
+              <a:lnSpc>
+                <a:spcPct val="100000"/>
+              </a:lnSpc>
+              <a:spcBef>
+                <a:spcPts val="0"/>
+              </a:spcBef>
+              <a:spcAft>
+                <a:spcPts val="800"/>
+              </a:spcAft>
+              <a:buChar char="●"/>
+            </a:pPr>
+            <a:r>
+              <a:rPr lang="en-US" sz="2000" dirty="0" smtClean="0"/>
+              <a:t>Features/Predictors</a:t>
+            </a:r>
+            <a:r>
+              <a:rPr lang="en-US" sz="2000" dirty="0" smtClean="0"/>
+              <a:t>:</a:t>
+            </a:r>
+            <a:endParaRPr lang="en-US" sz="2000" dirty="0" smtClean="0"/>
+          </a:p>
+        </p:txBody>
+      </p:sp>
+    </p:spTree>
+    <p:extLst>
+      <p:ext uri="{BB962C8B-B14F-4D97-AF65-F5344CB8AC3E}">
+        <p14:creationId xmlns:p14="http://schemas.microsoft.com/office/powerpoint/2010/main" val="1278094932"/>
+      </p:ext>
+    </p:extLst>
+  </p:cSld>
+  <p:clrMapOvr>
+    <a:masterClrMapping/>
+  </p:clrMapOvr>
+  <p:transition spd="slow">
+    <p:cut/>
+  </p:transition>
+  <p:timing>
+    <p:tnLst>
+      <p:par>
+        <p:cTn id="1" dur="indefinite" restart="never" nodeType="tmRoot"/>
+      </p:par>
+    </p:tnLst>
+  </p:timing>
 </p:sld>
 </file>
 
@@ -6392,7 +5394,7 @@
             </a:pPr>
             <a:r>
               <a:rPr lang="en" sz="4000" dirty="0" smtClean="0"/>
-              <a:t>PHP Program: streamTweets</a:t>
+              <a:t>SVM Classification</a:t>
             </a:r>
             <a:endParaRPr lang="en" sz="4000" dirty="0"/>
           </a:p>
@@ -6433,8 +5435,42 @@
             </a:pPr>
             <a:r>
               <a:rPr lang="en-US" sz="2000" dirty="0" smtClean="0"/>
-              <a:t>Interaction with the Public Stream API</a:t>
-            </a:r>
+              <a:t>Potential slide information:</a:t>
+            </a:r>
+          </a:p>
+          <a:p>
+            <a:pPr marL="857250" lvl="1" indent="-228600">
+              <a:spcAft>
+                <a:spcPts val="800"/>
+              </a:spcAft>
+              <a:buChar char="●"/>
+            </a:pPr>
+            <a:r>
+              <a:rPr lang="en-US" sz="1800" dirty="0" smtClean="0"/>
+              <a:t>Data labeling (binary classification as “popular” or “not popular”)</a:t>
+            </a:r>
+            <a:endParaRPr lang="en-US" sz="1800" dirty="0" smtClean="0"/>
+          </a:p>
+          <a:p>
+            <a:pPr marL="857250" lvl="1" indent="-228600">
+              <a:spcAft>
+                <a:spcPts val="800"/>
+              </a:spcAft>
+              <a:buChar char="●"/>
+            </a:pPr>
+            <a:r>
+              <a:rPr lang="en-US" sz="1800" dirty="0" err="1" smtClean="0"/>
+              <a:t>Matlab</a:t>
+            </a:r>
+            <a:r>
+              <a:rPr lang="en-US" sz="1800" dirty="0" smtClean="0"/>
+              <a:t> </a:t>
+            </a:r>
+            <a:r>
+              <a:rPr lang="en-US" sz="1800" dirty="0" smtClean="0"/>
+              <a:t>implementation of SVM</a:t>
+            </a:r>
+            <a:endParaRPr lang="en-US" sz="1800" dirty="0" smtClean="0"/>
           </a:p>
           <a:p>
             <a:pPr marL="457200" lvl="0" indent="-228600" rtl="0">
@@ -6449,10 +5485,7 @@
               </a:spcAft>
               <a:buChar char="●"/>
             </a:pPr>
-            <a:r>
-              <a:rPr lang="en-US" sz="2000" dirty="0" smtClean="0"/>
-              <a:t>Data collection run for 15 minutes at a time for ___ runs for a total of ___ tweets</a:t>
-            </a:r>
+            <a:endParaRPr lang="en" sz="1400" dirty="0" smtClean="0"/>
           </a:p>
           <a:p>
             <a:pPr marL="457200" lvl="0" indent="-228600" rtl="0">
@@ -6467,10 +5500,7 @@
               </a:spcAft>
               <a:buChar char="●"/>
             </a:pPr>
-            <a:r>
-              <a:rPr lang="en-US" sz="2000" dirty="0" smtClean="0"/>
-              <a:t>Program creates a CSV file and writes the chosen attributes for each Tweet to the file</a:t>
-            </a:r>
+            <a:endParaRPr lang="en" sz="1800" dirty="0" smtClean="0"/>
           </a:p>
           <a:p>
             <a:pPr marL="457200" lvl="0" indent="-228600" rtl="0">
@@ -6485,67 +5515,7 @@
               </a:spcAft>
               <a:buChar char="●"/>
             </a:pPr>
-            <a:r>
-              <a:rPr lang="en-US" sz="2000" dirty="0" smtClean="0"/>
-              <a:t>Preprocessing in the program:</a:t>
-            </a:r>
-          </a:p>
-          <a:p>
-            <a:pPr marL="857250" lvl="1" indent="-228600">
-              <a:spcAft>
-                <a:spcPts val="800"/>
-              </a:spcAft>
-              <a:buChar char="●"/>
-            </a:pPr>
-            <a:r>
-              <a:rPr lang="en-US" sz="1800" dirty="0" smtClean="0"/>
-              <a:t>Creation of an array of the most popular hashtags for additional feature analysis</a:t>
-            </a:r>
-          </a:p>
-          <a:p>
-            <a:pPr marL="857250" lvl="1" indent="-228600">
-              <a:spcAft>
-                <a:spcPts val="800"/>
-              </a:spcAft>
-              <a:buChar char="●"/>
-            </a:pPr>
-            <a:r>
-              <a:rPr lang="en-US" sz="1800" dirty="0" smtClean="0"/>
-              <a:t>Removal of commas (in order to use a CSV file output format)</a:t>
-            </a:r>
-          </a:p>
-          <a:p>
-            <a:pPr marL="857250" lvl="1" indent="-228600">
-              <a:spcAft>
-                <a:spcPts val="800"/>
-              </a:spcAft>
-              <a:buChar char="●"/>
-            </a:pPr>
-            <a:r>
-              <a:rPr lang="en" sz="1800" dirty="0" smtClean="0"/>
-              <a:t>Change of String type attributes to Binary or Integer Count attributes</a:t>
-            </a:r>
-          </a:p>
-          <a:p>
-            <a:pPr marL="457200" indent="-228600">
-              <a:spcAft>
-                <a:spcPts val="800"/>
-              </a:spcAft>
-              <a:buChar char="●"/>
-            </a:pPr>
-            <a:r>
-              <a:rPr lang="en" sz="2000" dirty="0" smtClean="0"/>
-              <a:t>Manual processing: addition of 10 features for binary presence of the 10 most popular hashtags in each Tweet</a:t>
-            </a:r>
-          </a:p>
-          <a:p>
-            <a:pPr marL="857250" lvl="1" indent="-228600">
-              <a:spcAft>
-                <a:spcPts val="800"/>
-              </a:spcAft>
-              <a:buChar char="●"/>
-            </a:pPr>
-            <a:endParaRPr lang="en" sz="1400" dirty="0" smtClean="0"/>
+            <a:endParaRPr lang="en" sz="1800" dirty="0" smtClean="0"/>
           </a:p>
           <a:p>
             <a:pPr marL="457200" lvl="0" indent="-228600" rtl="0">
@@ -6560,36 +5530,6 @@
               </a:spcAft>
               <a:buChar char="●"/>
             </a:pPr>
-            <a:endParaRPr lang="en" sz="1800" dirty="0" smtClean="0"/>
-          </a:p>
-          <a:p>
-            <a:pPr marL="457200" lvl="0" indent="-228600" rtl="0">
-              <a:lnSpc>
-                <a:spcPct val="100000"/>
-              </a:lnSpc>
-              <a:spcBef>
-                <a:spcPts val="0"/>
-              </a:spcBef>
-              <a:spcAft>
-                <a:spcPts val="800"/>
-              </a:spcAft>
-              <a:buChar char="●"/>
-            </a:pPr>
-            <a:endParaRPr lang="en" sz="1800" dirty="0" smtClean="0"/>
-          </a:p>
-          <a:p>
-            <a:pPr marL="457200" lvl="0" indent="-228600" rtl="0">
-              <a:lnSpc>
-                <a:spcPct val="100000"/>
-              </a:lnSpc>
-              <a:spcBef>
-                <a:spcPts val="0"/>
-              </a:spcBef>
-              <a:spcAft>
-                <a:spcPts val="800"/>
-              </a:spcAft>
-              <a:buChar char="●"/>
-            </a:pPr>
             <a:endParaRPr lang="en" sz="1800" dirty="0"/>
           </a:p>
         </p:txBody>
@@ -6597,7 +5537,7 @@
     </p:spTree>
     <p:extLst>
       <p:ext uri="{BB962C8B-B14F-4D97-AF65-F5344CB8AC3E}">
-        <p14:creationId xmlns:p14="http://schemas.microsoft.com/office/powerpoint/2010/main" val="4246482323"/>
+        <p14:creationId xmlns:p14="http://schemas.microsoft.com/office/powerpoint/2010/main" val="3375055757"/>
       </p:ext>
     </p:extLst>
   </p:cSld>
@@ -6645,6 +5585,10 @@
           </p:nvPr>
         </p:nvSpPr>
         <p:spPr>
+          <a:xfrm>
+            <a:off x="311698" y="593367"/>
+            <a:ext cx="8520599" cy="763599"/>
+          </a:xfrm>
           <a:prstGeom prst="rect">
             <a:avLst/>
           </a:prstGeom>
@@ -6663,7 +5607,7 @@
             </a:pPr>
             <a:r>
               <a:rPr lang="en" sz="4000" dirty="0" smtClean="0"/>
-              <a:t>PHP Program: searchTwitter</a:t>
+              <a:t>Results</a:t>
             </a:r>
             <a:endParaRPr lang="en" sz="4000" dirty="0"/>
           </a:p>
@@ -6704,8 +5648,9 @@
             </a:pPr>
             <a:r>
               <a:rPr lang="en-US" sz="2000" dirty="0" smtClean="0"/>
-              <a:t>Interaction with the Search API</a:t>
-            </a:r>
+              <a:t>TODO</a:t>
+            </a:r>
+            <a:endParaRPr lang="en-US" sz="2000" dirty="0" smtClean="0"/>
           </a:p>
           <a:p>
             <a:pPr marL="457200" lvl="0" indent="-228600" rtl="0">
@@ -6720,10 +5665,7 @@
               </a:spcAft>
               <a:buChar char="●"/>
             </a:pPr>
-            <a:r>
-              <a:rPr lang="en-US" sz="2000" dirty="0" smtClean="0"/>
-              <a:t>Runs 10 minutes, 30 minutes, 1 hour, and 20 hours after every data collection</a:t>
-            </a:r>
+            <a:endParaRPr lang="en" sz="1400" dirty="0" smtClean="0"/>
           </a:p>
           <a:p>
             <a:pPr marL="457200" lvl="0" indent="-228600" rtl="0">
@@ -6738,10 +5680,7 @@
               </a:spcAft>
               <a:buChar char="●"/>
             </a:pPr>
-            <a:r>
-              <a:rPr lang="en-US" sz="2000" dirty="0" smtClean="0"/>
-              <a:t>Returns the retweet count and favorite count of each Tweet</a:t>
-            </a:r>
+            <a:endParaRPr lang="en" sz="1800" dirty="0" smtClean="0"/>
           </a:p>
           <a:p>
             <a:pPr marL="457200" lvl="0" indent="-228600" rtl="0">
@@ -6756,10 +5695,7 @@
               </a:spcAft>
               <a:buChar char="●"/>
             </a:pPr>
-            <a:r>
-              <a:rPr lang="en-US" sz="2000" dirty="0" smtClean="0"/>
-              <a:t>Manual processing: addition of the counts from the 10 minute, 30 minute, and 1 hour searches to the data from the streaming</a:t>
-            </a:r>
+            <a:endParaRPr lang="en" sz="1800" dirty="0" smtClean="0"/>
           </a:p>
           <a:p>
             <a:pPr marL="457200" lvl="0" indent="-228600" rtl="0">
@@ -6774,132 +5710,23 @@
               </a:spcAft>
               <a:buChar char="●"/>
             </a:pPr>
-            <a:r>
-              <a:rPr lang="en-US" sz="2000" dirty="0" smtClean="0"/>
-              <a:t>20 hour search data used as the </a:t>
-            </a:r>
-            <a:r>
-              <a:rPr lang="en-US" sz="2000" dirty="0" err="1" smtClean="0"/>
-              <a:t>predictand</a:t>
-            </a:r>
-            <a:r>
-              <a:rPr lang="en-US" sz="2000" dirty="0" smtClean="0"/>
-              <a:t> for training</a:t>
-            </a:r>
-          </a:p>
-          <a:p>
-            <a:pPr marL="457200" lvl="0" indent="-228600" rtl="0">
-              <a:lnSpc>
-                <a:spcPct val="100000"/>
-              </a:lnSpc>
-              <a:spcBef>
-                <a:spcPts val="0"/>
-              </a:spcBef>
-              <a:spcAft>
-                <a:spcPts val="800"/>
-              </a:spcAft>
-              <a:buChar char="●"/>
-            </a:pPr>
-            <a:endParaRPr lang="en" sz="1400" dirty="0" smtClean="0"/>
-          </a:p>
-          <a:p>
-            <a:pPr marL="457200" lvl="0" indent="-228600" rtl="0">
-              <a:lnSpc>
-                <a:spcPct val="100000"/>
-              </a:lnSpc>
-              <a:spcBef>
-                <a:spcPts val="0"/>
-              </a:spcBef>
-              <a:spcAft>
-                <a:spcPts val="800"/>
-              </a:spcAft>
-              <a:buChar char="●"/>
-            </a:pPr>
-            <a:endParaRPr lang="en" sz="1800" dirty="0" smtClean="0"/>
-          </a:p>
-          <a:p>
-            <a:pPr marL="457200" lvl="0" indent="-228600" rtl="0">
-              <a:lnSpc>
-                <a:spcPct val="100000"/>
-              </a:lnSpc>
-              <a:spcBef>
-                <a:spcPts val="0"/>
-              </a:spcBef>
-              <a:spcAft>
-                <a:spcPts val="800"/>
-              </a:spcAft>
-              <a:buChar char="●"/>
-            </a:pPr>
-            <a:endParaRPr lang="en" sz="1800" dirty="0" smtClean="0"/>
-          </a:p>
-          <a:p>
-            <a:pPr marL="457200" lvl="0" indent="-228600" rtl="0">
-              <a:lnSpc>
-                <a:spcPct val="100000"/>
-              </a:lnSpc>
-              <a:spcBef>
-                <a:spcPts val="0"/>
-              </a:spcBef>
-              <a:spcAft>
-                <a:spcPts val="800"/>
-              </a:spcAft>
-              <a:buChar char="●"/>
-            </a:pPr>
             <a:endParaRPr lang="en" sz="1800" dirty="0"/>
           </a:p>
         </p:txBody>
       </p:sp>
-    </p:spTree>
-    <p:extLst>
-      <p:ext uri="{BB962C8B-B14F-4D97-AF65-F5344CB8AC3E}">
-        <p14:creationId xmlns:p14="http://schemas.microsoft.com/office/powerpoint/2010/main" val="542900234"/>
-      </p:ext>
-    </p:extLst>
-  </p:cSld>
-  <p:clrMapOvr>
-    <a:masterClrMapping/>
-  </p:clrMapOvr>
-  <p:transition spd="slow">
-    <p:cut/>
-  </p:transition>
-  <p:timing>
-    <p:tnLst>
-      <p:par>
-        <p:cTn id="1" dur="indefinite" restart="never" nodeType="tmRoot"/>
-      </p:par>
-    </p:tnLst>
-  </p:timing>
-</p:sld>
-</file>
-
-<file path=ppt/slides/slide7.xml><?xml version="1.0" encoding="utf-8"?>
-<p:sld xmlns:a="http://schemas.openxmlformats.org/drawingml/2006/main" xmlns:r="http://schemas.openxmlformats.org/officeDocument/2006/relationships" xmlns:p="http://schemas.openxmlformats.org/presentationml/2006/main">
-  <p:cSld>
-    <p:spTree>
-      <p:nvGrpSpPr>
-        <p:cNvPr id="1" name="Shape 55"/>
-        <p:cNvGrpSpPr/>
-        <p:nvPr/>
-      </p:nvGrpSpPr>
-      <p:grpSpPr>
-        <a:xfrm>
-          <a:off x="0" y="0"/>
-          <a:ext cx="0" cy="0"/>
-          <a:chOff x="0" y="0"/>
-          <a:chExt cx="0" cy="0"/>
-        </a:xfrm>
-      </p:grpSpPr>
-      <p:sp>
-        <p:nvSpPr>
-          <p:cNvPr id="56" name="Shape 56"/>
+      <p:sp>
+        <p:nvSpPr>
+          <p:cNvPr id="4" name="Shape 56"/>
           <p:cNvSpPr txBox="1">
-            <a:spLocks noGrp="1"/>
-          </p:cNvSpPr>
-          <p:nvPr>
-            <p:ph type="title"/>
-          </p:nvPr>
+            <a:spLocks/>
+          </p:cNvSpPr>
+          <p:nvPr/>
         </p:nvSpPr>
         <p:spPr>
+          <a:xfrm>
+            <a:off x="311700" y="3050634"/>
+            <a:ext cx="8520599" cy="763599"/>
+          </a:xfrm>
           <a:prstGeom prst="rect">
             <a:avLst/>
           </a:prstGeom>
@@ -6908,17 +5735,157 @@
           <a:bodyPr lIns="91425" tIns="91425" rIns="91425" bIns="91425" anchor="t" anchorCtr="0">
             <a:noAutofit/>
           </a:bodyPr>
-          <a:lstStyle/>
-          <a:p>
-            <a:pPr algn="l">
-              <a:spcBef>
-                <a:spcPts val="0"/>
-              </a:spcBef>
-              <a:buNone/>
-            </a:pPr>
+          <a:lstStyle>
+            <a:lvl1pPr algn="ctr" defTabSz="457200" rtl="0" eaLnBrk="1" fontAlgn="base" hangingPunct="1">
+              <a:spcBef>
+                <a:spcPts val="0"/>
+              </a:spcBef>
+              <a:spcAft>
+                <a:spcPct val="0"/>
+              </a:spcAft>
+              <a:defRPr sz="4400" kern="1200">
+                <a:solidFill>
+                  <a:schemeClr val="tx1"/>
+                </a:solidFill>
+                <a:latin typeface="Gotham Book"/>
+                <a:ea typeface="ＭＳ Ｐゴシック" charset="-128"/>
+                <a:cs typeface="ＭＳ Ｐゴシック" charset="-128"/>
+              </a:defRPr>
+            </a:lvl1pPr>
+            <a:lvl2pPr algn="ctr" defTabSz="457200" rtl="0" eaLnBrk="1" fontAlgn="base" hangingPunct="1">
+              <a:spcBef>
+                <a:spcPts val="0"/>
+              </a:spcBef>
+              <a:spcAft>
+                <a:spcPct val="0"/>
+              </a:spcAft>
+              <a:defRPr sz="4400">
+                <a:solidFill>
+                  <a:schemeClr val="tx1"/>
+                </a:solidFill>
+                <a:latin typeface="Gotham Book" charset="0"/>
+                <a:ea typeface="ＭＳ Ｐゴシック" charset="-128"/>
+                <a:cs typeface="ＭＳ Ｐゴシック" charset="-128"/>
+              </a:defRPr>
+            </a:lvl2pPr>
+            <a:lvl3pPr algn="ctr" defTabSz="457200" rtl="0" eaLnBrk="1" fontAlgn="base" hangingPunct="1">
+              <a:spcBef>
+                <a:spcPts val="0"/>
+              </a:spcBef>
+              <a:spcAft>
+                <a:spcPct val="0"/>
+              </a:spcAft>
+              <a:defRPr sz="4400">
+                <a:solidFill>
+                  <a:schemeClr val="tx1"/>
+                </a:solidFill>
+                <a:latin typeface="Gotham Book" charset="0"/>
+                <a:ea typeface="ＭＳ Ｐゴシック" charset="-128"/>
+                <a:cs typeface="ＭＳ Ｐゴシック" charset="-128"/>
+              </a:defRPr>
+            </a:lvl3pPr>
+            <a:lvl4pPr algn="ctr" defTabSz="457200" rtl="0" eaLnBrk="1" fontAlgn="base" hangingPunct="1">
+              <a:spcBef>
+                <a:spcPts val="0"/>
+              </a:spcBef>
+              <a:spcAft>
+                <a:spcPct val="0"/>
+              </a:spcAft>
+              <a:defRPr sz="4400">
+                <a:solidFill>
+                  <a:schemeClr val="tx1"/>
+                </a:solidFill>
+                <a:latin typeface="Gotham Book" charset="0"/>
+                <a:ea typeface="ＭＳ Ｐゴシック" charset="-128"/>
+                <a:cs typeface="ＭＳ Ｐゴシック" charset="-128"/>
+              </a:defRPr>
+            </a:lvl4pPr>
+            <a:lvl5pPr algn="ctr" defTabSz="457200" rtl="0" eaLnBrk="1" fontAlgn="base" hangingPunct="1">
+              <a:spcBef>
+                <a:spcPts val="0"/>
+              </a:spcBef>
+              <a:spcAft>
+                <a:spcPct val="0"/>
+              </a:spcAft>
+              <a:defRPr sz="4400">
+                <a:solidFill>
+                  <a:schemeClr val="tx1"/>
+                </a:solidFill>
+                <a:latin typeface="Gotham Book" charset="0"/>
+                <a:ea typeface="ＭＳ Ｐゴシック" charset="-128"/>
+                <a:cs typeface="ＭＳ Ｐゴシック" charset="-128"/>
+              </a:defRPr>
+            </a:lvl5pPr>
+            <a:lvl6pPr marL="457200" algn="ctr" defTabSz="457200" rtl="0" eaLnBrk="1" fontAlgn="base" hangingPunct="1">
+              <a:spcBef>
+                <a:spcPts val="0"/>
+              </a:spcBef>
+              <a:spcAft>
+                <a:spcPct val="0"/>
+              </a:spcAft>
+              <a:defRPr sz="4400">
+                <a:solidFill>
+                  <a:schemeClr val="tx1"/>
+                </a:solidFill>
+                <a:latin typeface="Gotham Book" charset="0"/>
+                <a:ea typeface="ＭＳ Ｐゴシック" charset="-128"/>
+                <a:cs typeface="ＭＳ Ｐゴシック" charset="-128"/>
+              </a:defRPr>
+            </a:lvl6pPr>
+            <a:lvl7pPr marL="914400" algn="ctr" defTabSz="457200" rtl="0" eaLnBrk="1" fontAlgn="base" hangingPunct="1">
+              <a:spcBef>
+                <a:spcPts val="0"/>
+              </a:spcBef>
+              <a:spcAft>
+                <a:spcPct val="0"/>
+              </a:spcAft>
+              <a:defRPr sz="4400">
+                <a:solidFill>
+                  <a:schemeClr val="tx1"/>
+                </a:solidFill>
+                <a:latin typeface="Gotham Book" charset="0"/>
+                <a:ea typeface="ＭＳ Ｐゴシック" charset="-128"/>
+                <a:cs typeface="ＭＳ Ｐゴシック" charset="-128"/>
+              </a:defRPr>
+            </a:lvl7pPr>
+            <a:lvl8pPr marL="1371600" algn="ctr" defTabSz="457200" rtl="0" eaLnBrk="1" fontAlgn="base" hangingPunct="1">
+              <a:spcBef>
+                <a:spcPts val="0"/>
+              </a:spcBef>
+              <a:spcAft>
+                <a:spcPct val="0"/>
+              </a:spcAft>
+              <a:defRPr sz="4400">
+                <a:solidFill>
+                  <a:schemeClr val="tx1"/>
+                </a:solidFill>
+                <a:latin typeface="Gotham Book" charset="0"/>
+                <a:ea typeface="ＭＳ Ｐゴシック" charset="-128"/>
+                <a:cs typeface="ＭＳ Ｐゴシック" charset="-128"/>
+              </a:defRPr>
+            </a:lvl8pPr>
+            <a:lvl9pPr marL="1828800" algn="ctr" defTabSz="457200" rtl="0" eaLnBrk="1" fontAlgn="base" hangingPunct="1">
+              <a:spcBef>
+                <a:spcPts val="0"/>
+              </a:spcBef>
+              <a:spcAft>
+                <a:spcPct val="0"/>
+              </a:spcAft>
+              <a:defRPr sz="4400">
+                <a:solidFill>
+                  <a:schemeClr val="tx1"/>
+                </a:solidFill>
+                <a:latin typeface="Gotham Book" charset="0"/>
+                <a:ea typeface="ＭＳ Ｐゴシック" charset="-128"/>
+                <a:cs typeface="ＭＳ Ｐゴシック" charset="-128"/>
+              </a:defRPr>
+            </a:lvl9pPr>
+          </a:lstStyle>
+          <a:p>
+            <a:pPr algn="l"/>
             <a:r>
               <a:rPr lang="en" sz="4000" dirty="0" smtClean="0"/>
-              <a:t>Manual Data Labeling</a:t>
+              <a:t>Conclusions</a:t>
             </a:r>
             <a:endParaRPr lang="en" sz="4000" dirty="0"/>
           </a:p>
@@ -6926,15 +5893,17 @@
       </p:sp>
       <p:sp>
         <p:nvSpPr>
-          <p:cNvPr id="57" name="Shape 57"/>
+          <p:cNvPr id="5" name="Shape 57"/>
           <p:cNvSpPr txBox="1">
-            <a:spLocks noGrp="1"/>
-          </p:cNvSpPr>
-          <p:nvPr>
-            <p:ph type="body" idx="1"/>
-          </p:nvPr>
+            <a:spLocks/>
+          </p:cNvSpPr>
+          <p:nvPr/>
         </p:nvSpPr>
         <p:spPr>
+          <a:xfrm>
+            <a:off x="311699" y="4164621"/>
+            <a:ext cx="8520599" cy="1576823"/>
+          </a:xfrm>
           <a:prstGeom prst="rect">
             <a:avLst/>
           </a:prstGeom>
@@ -6943,81 +5912,208 @@
           <a:bodyPr lIns="91425" tIns="91425" rIns="91425" bIns="91425" anchor="t" anchorCtr="0">
             <a:noAutofit/>
           </a:bodyPr>
-          <a:lstStyle/>
-          <a:p>
-            <a:pPr marL="457200" lvl="0" indent="-228600" rtl="0">
-              <a:lnSpc>
-                <a:spcPct val="100000"/>
-              </a:lnSpc>
-              <a:spcBef>
-                <a:spcPts val="0"/>
-              </a:spcBef>
+          <a:lstStyle>
+            <a:lvl1pPr marL="342900" indent="-342900" algn="l" defTabSz="457200" rtl="0" eaLnBrk="1" fontAlgn="base" hangingPunct="1">
+              <a:spcBef>
+                <a:spcPts val="0"/>
+              </a:spcBef>
+              <a:spcAft>
+                <a:spcPct val="0"/>
+              </a:spcAft>
+              <a:buFont typeface="Arial" charset="0"/>
+              <a:buChar char="•"/>
+              <a:defRPr sz="3200" kern="1200">
+                <a:solidFill>
+                  <a:schemeClr val="tx1"/>
+                </a:solidFill>
+                <a:latin typeface="Gotham Book"/>
+                <a:ea typeface="ＭＳ Ｐゴシック" charset="-128"/>
+                <a:cs typeface="ＭＳ Ｐゴシック" charset="-128"/>
+              </a:defRPr>
+            </a:lvl1pPr>
+            <a:lvl2pPr marL="742950" indent="-285750" algn="l" defTabSz="457200" rtl="0" eaLnBrk="1" fontAlgn="base" hangingPunct="1">
+              <a:spcBef>
+                <a:spcPts val="0"/>
+              </a:spcBef>
+              <a:spcAft>
+                <a:spcPct val="0"/>
+              </a:spcAft>
+              <a:buFont typeface="Arial" charset="0"/>
+              <a:buChar char="–"/>
+              <a:defRPr sz="2800" kern="1200">
+                <a:solidFill>
+                  <a:schemeClr val="tx1"/>
+                </a:solidFill>
+                <a:latin typeface="Gotham Book"/>
+                <a:ea typeface="ＭＳ Ｐゴシック" charset="-128"/>
+                <a:cs typeface="+mn-cs"/>
+              </a:defRPr>
+            </a:lvl2pPr>
+            <a:lvl3pPr marL="1143000" indent="-228600" algn="l" defTabSz="457200" rtl="0" eaLnBrk="1" fontAlgn="base" hangingPunct="1">
+              <a:spcBef>
+                <a:spcPts val="0"/>
+              </a:spcBef>
+              <a:spcAft>
+                <a:spcPct val="0"/>
+              </a:spcAft>
+              <a:buFont typeface="Arial" charset="0"/>
+              <a:buChar char="•"/>
+              <a:defRPr sz="2400" kern="1200">
+                <a:solidFill>
+                  <a:schemeClr val="tx1"/>
+                </a:solidFill>
+                <a:latin typeface="Gotham Book"/>
+                <a:ea typeface="ＭＳ Ｐゴシック" charset="-128"/>
+                <a:cs typeface="+mn-cs"/>
+              </a:defRPr>
+            </a:lvl3pPr>
+            <a:lvl4pPr marL="1600200" indent="-228600" algn="l" defTabSz="457200" rtl="0" eaLnBrk="1" fontAlgn="base" hangingPunct="1">
+              <a:spcBef>
+                <a:spcPts val="0"/>
+              </a:spcBef>
+              <a:spcAft>
+                <a:spcPct val="0"/>
+              </a:spcAft>
+              <a:buFont typeface="Arial" charset="0"/>
+              <a:buChar char="–"/>
+              <a:defRPr sz="2000" kern="1200">
+                <a:solidFill>
+                  <a:schemeClr val="tx1"/>
+                </a:solidFill>
+                <a:latin typeface="Gotham Book"/>
+                <a:ea typeface="ＭＳ Ｐゴシック" charset="-128"/>
+                <a:cs typeface="+mn-cs"/>
+              </a:defRPr>
+            </a:lvl4pPr>
+            <a:lvl5pPr marL="2057400" indent="-228600" algn="l" defTabSz="457200" rtl="0" eaLnBrk="1" fontAlgn="base" hangingPunct="1">
+              <a:spcBef>
+                <a:spcPts val="0"/>
+              </a:spcBef>
+              <a:spcAft>
+                <a:spcPct val="0"/>
+              </a:spcAft>
+              <a:buFont typeface="Arial" charset="0"/>
+              <a:buChar char="»"/>
+              <a:defRPr sz="2000" kern="1200">
+                <a:solidFill>
+                  <a:schemeClr val="tx1"/>
+                </a:solidFill>
+                <a:latin typeface="Gotham Book"/>
+                <a:ea typeface="ＭＳ Ｐゴシック" charset="-128"/>
+                <a:cs typeface="+mn-cs"/>
+              </a:defRPr>
+            </a:lvl5pPr>
+            <a:lvl6pPr marL="2514600" indent="-228600" algn="l" defTabSz="457200" rtl="0" eaLnBrk="1" latinLnBrk="0" hangingPunct="1">
+              <a:spcBef>
+                <a:spcPts val="0"/>
+              </a:spcBef>
+              <a:buFont typeface="Arial"/>
+              <a:buChar char="•"/>
+              <a:defRPr sz="2000" kern="1200">
+                <a:solidFill>
+                  <a:schemeClr val="tx1"/>
+                </a:solidFill>
+                <a:latin typeface="+mn-lt"/>
+                <a:ea typeface="+mn-ea"/>
+                <a:cs typeface="+mn-cs"/>
+              </a:defRPr>
+            </a:lvl6pPr>
+            <a:lvl7pPr marL="2971800" indent="-228600" algn="l" defTabSz="457200" rtl="0" eaLnBrk="1" latinLnBrk="0" hangingPunct="1">
+              <a:spcBef>
+                <a:spcPts val="0"/>
+              </a:spcBef>
+              <a:buFont typeface="Arial"/>
+              <a:buChar char="•"/>
+              <a:defRPr sz="2000" kern="1200">
+                <a:solidFill>
+                  <a:schemeClr val="tx1"/>
+                </a:solidFill>
+                <a:latin typeface="+mn-lt"/>
+                <a:ea typeface="+mn-ea"/>
+                <a:cs typeface="+mn-cs"/>
+              </a:defRPr>
+            </a:lvl7pPr>
+            <a:lvl8pPr marL="3429000" indent="-228600" algn="l" defTabSz="457200" rtl="0" eaLnBrk="1" latinLnBrk="0" hangingPunct="1">
+              <a:spcBef>
+                <a:spcPts val="0"/>
+              </a:spcBef>
+              <a:buFont typeface="Arial"/>
+              <a:buChar char="•"/>
+              <a:defRPr sz="2000" kern="1200">
+                <a:solidFill>
+                  <a:schemeClr val="tx1"/>
+                </a:solidFill>
+                <a:latin typeface="+mn-lt"/>
+                <a:ea typeface="+mn-ea"/>
+                <a:cs typeface="+mn-cs"/>
+              </a:defRPr>
+            </a:lvl8pPr>
+            <a:lvl9pPr marL="3886200" indent="-228600" algn="l" defTabSz="457200" rtl="0" eaLnBrk="1" latinLnBrk="0" hangingPunct="1">
+              <a:spcBef>
+                <a:spcPts val="0"/>
+              </a:spcBef>
+              <a:buFont typeface="Arial"/>
+              <a:buChar char="•"/>
+              <a:defRPr sz="2000" kern="1200">
+                <a:solidFill>
+                  <a:schemeClr val="tx1"/>
+                </a:solidFill>
+                <a:latin typeface="+mn-lt"/>
+                <a:ea typeface="+mn-ea"/>
+                <a:cs typeface="+mn-cs"/>
+              </a:defRPr>
+            </a:lvl9pPr>
+          </a:lstStyle>
+          <a:p>
+            <a:pPr marL="457200" indent="-228600">
               <a:spcAft>
                 <a:spcPts val="800"/>
               </a:spcAft>
+              <a:buFont typeface="Arial" charset="0"/>
               <a:buChar char="●"/>
             </a:pPr>
             <a:r>
               <a:rPr lang="en-US" sz="2000" dirty="0" smtClean="0"/>
               <a:t>TODO</a:t>
             </a:r>
-          </a:p>
-          <a:p>
-            <a:pPr marL="457200" lvl="0" indent="-228600" rtl="0">
-              <a:lnSpc>
-                <a:spcPct val="100000"/>
-              </a:lnSpc>
-              <a:spcBef>
-                <a:spcPts val="0"/>
-              </a:spcBef>
+            <a:endParaRPr lang="en" sz="1800" dirty="0" smtClean="0"/>
+          </a:p>
+          <a:p>
+            <a:pPr marL="857250" lvl="1" indent="-228600">
               <a:spcAft>
                 <a:spcPts val="800"/>
               </a:spcAft>
+              <a:buFont typeface="Arial" charset="0"/>
               <a:buChar char="●"/>
             </a:pPr>
             <a:endParaRPr lang="en" sz="1400" dirty="0" smtClean="0"/>
           </a:p>
           <a:p>
-            <a:pPr marL="457200" lvl="0" indent="-228600" rtl="0">
-              <a:lnSpc>
-                <a:spcPct val="100000"/>
-              </a:lnSpc>
-              <a:spcBef>
-                <a:spcPts val="0"/>
-              </a:spcBef>
+            <a:pPr marL="457200" indent="-228600">
               <a:spcAft>
                 <a:spcPts val="800"/>
               </a:spcAft>
+              <a:buFont typeface="Arial" charset="0"/>
               <a:buChar char="●"/>
             </a:pPr>
             <a:endParaRPr lang="en" sz="1800" dirty="0" smtClean="0"/>
           </a:p>
           <a:p>
-            <a:pPr marL="457200" lvl="0" indent="-228600" rtl="0">
-              <a:lnSpc>
-                <a:spcPct val="100000"/>
-              </a:lnSpc>
-              <a:spcBef>
-                <a:spcPts val="0"/>
-              </a:spcBef>
+            <a:pPr marL="457200" indent="-228600">
               <a:spcAft>
                 <a:spcPts val="800"/>
               </a:spcAft>
+              <a:buFont typeface="Arial" charset="0"/>
               <a:buChar char="●"/>
             </a:pPr>
             <a:endParaRPr lang="en" sz="1800" dirty="0" smtClean="0"/>
           </a:p>
           <a:p>
-            <a:pPr marL="457200" lvl="0" indent="-228600" rtl="0">
-              <a:lnSpc>
-                <a:spcPct val="100000"/>
-              </a:lnSpc>
-              <a:spcBef>
-                <a:spcPts val="0"/>
-              </a:spcBef>
+            <a:pPr marL="457200" indent="-228600">
               <a:spcAft>
                 <a:spcPts val="800"/>
               </a:spcAft>
+              <a:buFont typeface="Arial" charset="0"/>
               <a:buChar char="●"/>
             </a:pPr>
             <a:endParaRPr lang="en" sz="1800" dirty="0"/>
@@ -7027,235 +6123,7 @@
     </p:spTree>
     <p:extLst>
       <p:ext uri="{BB962C8B-B14F-4D97-AF65-F5344CB8AC3E}">
-        <p14:creationId xmlns:p14="http://schemas.microsoft.com/office/powerpoint/2010/main" val="3484929958"/>
-      </p:ext>
-    </p:extLst>
-  </p:cSld>
-  <p:clrMapOvr>
-    <a:masterClrMapping/>
-  </p:clrMapOvr>
-  <p:transition spd="slow">
-    <p:cut/>
-  </p:transition>
-  <p:timing>
-    <p:tnLst>
-      <p:par>
-        <p:cTn id="1" dur="indefinite" restart="never" nodeType="tmRoot"/>
-      </p:par>
-    </p:tnLst>
-  </p:timing>
-</p:sld>
-</file>
-
-<file path=ppt/slides/slide8.xml><?xml version="1.0" encoding="utf-8"?>
-<p:sld xmlns:a="http://schemas.openxmlformats.org/drawingml/2006/main" xmlns:r="http://schemas.openxmlformats.org/officeDocument/2006/relationships" xmlns:p="http://schemas.openxmlformats.org/presentationml/2006/main">
-  <p:cSld>
-    <p:spTree>
-      <p:nvGrpSpPr>
-        <p:cNvPr id="1" name=""/>
-        <p:cNvGrpSpPr/>
-        <p:nvPr/>
-      </p:nvGrpSpPr>
-      <p:grpSpPr>
-        <a:xfrm>
-          <a:off x="0" y="0"/>
-          <a:ext cx="0" cy="0"/>
-          <a:chOff x="0" y="0"/>
-          <a:chExt cx="0" cy="0"/>
-        </a:xfrm>
-      </p:grpSpPr>
-      <p:sp>
-        <p:nvSpPr>
-          <p:cNvPr id="4" name="Title 3"/>
-          <p:cNvSpPr>
-            <a:spLocks noGrp="1"/>
-          </p:cNvSpPr>
-          <p:nvPr>
-            <p:ph type="title"/>
-          </p:nvPr>
-        </p:nvSpPr>
-        <p:spPr/>
-        <p:txBody>
-          <a:bodyPr/>
-          <a:lstStyle/>
-          <a:p>
-            <a:r>
-              <a:rPr lang="en-US" dirty="0" smtClean="0"/>
-              <a:t>Predictive Modeling and Test</a:t>
-            </a:r>
-            <a:endParaRPr lang="en-US" dirty="0"/>
-          </a:p>
-        </p:txBody>
-      </p:sp>
-    </p:spTree>
-    <p:extLst>
-      <p:ext uri="{BB962C8B-B14F-4D97-AF65-F5344CB8AC3E}">
-        <p14:creationId xmlns:p14="http://schemas.microsoft.com/office/powerpoint/2010/main" val="927543034"/>
-      </p:ext>
-    </p:extLst>
-  </p:cSld>
-  <p:clrMapOvr>
-    <a:masterClrMapping/>
-  </p:clrMapOvr>
-</p:sld>
-</file>
-
-<file path=ppt/slides/slide9.xml><?xml version="1.0" encoding="utf-8"?>
-<p:sld xmlns:a="http://schemas.openxmlformats.org/drawingml/2006/main" xmlns:r="http://schemas.openxmlformats.org/officeDocument/2006/relationships" xmlns:p="http://schemas.openxmlformats.org/presentationml/2006/main">
-  <p:cSld>
-    <p:spTree>
-      <p:nvGrpSpPr>
-        <p:cNvPr id="1" name="Shape 55"/>
-        <p:cNvGrpSpPr/>
-        <p:nvPr/>
-      </p:nvGrpSpPr>
-      <p:grpSpPr>
-        <a:xfrm>
-          <a:off x="0" y="0"/>
-          <a:ext cx="0" cy="0"/>
-          <a:chOff x="0" y="0"/>
-          <a:chExt cx="0" cy="0"/>
-        </a:xfrm>
-      </p:grpSpPr>
-      <p:sp>
-        <p:nvSpPr>
-          <p:cNvPr id="56" name="Shape 56"/>
-          <p:cNvSpPr txBox="1">
-            <a:spLocks noGrp="1"/>
-          </p:cNvSpPr>
-          <p:nvPr>
-            <p:ph type="title"/>
-          </p:nvPr>
-        </p:nvSpPr>
-        <p:spPr>
-          <a:prstGeom prst="rect">
-            <a:avLst/>
-          </a:prstGeom>
-        </p:spPr>
-        <p:txBody>
-          <a:bodyPr lIns="91425" tIns="91425" rIns="91425" bIns="91425" anchor="t" anchorCtr="0">
-            <a:noAutofit/>
-          </a:bodyPr>
-          <a:lstStyle/>
-          <a:p>
-            <a:pPr algn="l">
-              <a:spcBef>
-                <a:spcPts val="0"/>
-              </a:spcBef>
-              <a:buNone/>
-            </a:pPr>
-            <a:r>
-              <a:rPr lang="en" sz="4000" dirty="0" smtClean="0"/>
-              <a:t>SVM Classification in Matlab</a:t>
-            </a:r>
-            <a:endParaRPr lang="en" sz="4000" dirty="0"/>
-          </a:p>
-        </p:txBody>
-      </p:sp>
-      <p:sp>
-        <p:nvSpPr>
-          <p:cNvPr id="57" name="Shape 57"/>
-          <p:cNvSpPr txBox="1">
-            <a:spLocks noGrp="1"/>
-          </p:cNvSpPr>
-          <p:nvPr>
-            <p:ph type="body" idx="1"/>
-          </p:nvPr>
-        </p:nvSpPr>
-        <p:spPr>
-          <a:prstGeom prst="rect">
-            <a:avLst/>
-          </a:prstGeom>
-        </p:spPr>
-        <p:txBody>
-          <a:bodyPr lIns="91425" tIns="91425" rIns="91425" bIns="91425" anchor="t" anchorCtr="0">
-            <a:noAutofit/>
-          </a:bodyPr>
-          <a:lstStyle/>
-          <a:p>
-            <a:pPr marL="457200" lvl="0" indent="-228600" rtl="0">
-              <a:lnSpc>
-                <a:spcPct val="100000"/>
-              </a:lnSpc>
-              <a:spcBef>
-                <a:spcPts val="0"/>
-              </a:spcBef>
-              <a:spcAft>
-                <a:spcPts val="800"/>
-              </a:spcAft>
-              <a:buChar char="●"/>
-            </a:pPr>
-            <a:r>
-              <a:rPr lang="en-US" sz="2000" dirty="0" smtClean="0"/>
-              <a:t>TODO</a:t>
-            </a:r>
-          </a:p>
-          <a:p>
-            <a:pPr marL="457200" lvl="0" indent="-228600" rtl="0">
-              <a:lnSpc>
-                <a:spcPct val="100000"/>
-              </a:lnSpc>
-              <a:spcBef>
-                <a:spcPts val="0"/>
-              </a:spcBef>
-              <a:spcAft>
-                <a:spcPts val="800"/>
-              </a:spcAft>
-              <a:buChar char="●"/>
-            </a:pPr>
-            <a:endParaRPr lang="en" sz="1400" dirty="0" smtClean="0"/>
-          </a:p>
-          <a:p>
-            <a:pPr marL="457200" lvl="0" indent="-228600" rtl="0">
-              <a:lnSpc>
-                <a:spcPct val="100000"/>
-              </a:lnSpc>
-              <a:spcBef>
-                <a:spcPts val="0"/>
-              </a:spcBef>
-              <a:spcAft>
-                <a:spcPts val="800"/>
-              </a:spcAft>
-              <a:buChar char="●"/>
-            </a:pPr>
-            <a:endParaRPr lang="en" sz="1800" dirty="0" smtClean="0"/>
-          </a:p>
-          <a:p>
-            <a:pPr marL="457200" lvl="0" indent="-228600" rtl="0">
-              <a:lnSpc>
-                <a:spcPct val="100000"/>
-              </a:lnSpc>
-              <a:spcBef>
-                <a:spcPts val="0"/>
-              </a:spcBef>
-              <a:spcAft>
-                <a:spcPts val="800"/>
-              </a:spcAft>
-              <a:buChar char="●"/>
-            </a:pPr>
-            <a:endParaRPr lang="en" sz="1800" dirty="0" smtClean="0"/>
-          </a:p>
-          <a:p>
-            <a:pPr marL="457200" lvl="0" indent="-228600" rtl="0">
-              <a:lnSpc>
-                <a:spcPct val="100000"/>
-              </a:lnSpc>
-              <a:spcBef>
-                <a:spcPts val="0"/>
-              </a:spcBef>
-              <a:spcAft>
-                <a:spcPts val="800"/>
-              </a:spcAft>
-              <a:buChar char="●"/>
-            </a:pPr>
-            <a:endParaRPr lang="en" sz="1800" dirty="0"/>
-          </a:p>
-        </p:txBody>
-      </p:sp>
-    </p:spTree>
-    <p:extLst>
-      <p:ext uri="{BB962C8B-B14F-4D97-AF65-F5344CB8AC3E}">
-        <p14:creationId xmlns:p14="http://schemas.microsoft.com/office/powerpoint/2010/main" val="3375055757"/>
+        <p14:creationId xmlns:p14="http://schemas.microsoft.com/office/powerpoint/2010/main" val="3638152437"/>
       </p:ext>
     </p:extLst>
   </p:cSld>

</xml_diff>